<commit_message>
check the parameters for receiver optical
</commit_message>
<xml_diff>
--- a/NSTX-U High-k scattering Calculation_20240717.pptx
+++ b/NSTX-U High-k scattering Calculation_20240717.pptx
@@ -5,7 +5,7 @@
     <p:sldMasterId id="2147483648" r:id="rId1"/>
   </p:sldMasterIdLst>
   <p:notesMasterIdLst>
-    <p:notesMasterId r:id="rId19"/>
+    <p:notesMasterId r:id="rId20"/>
   </p:notesMasterIdLst>
   <p:sldIdLst>
     <p:sldId id="256" r:id="rId2"/>
@@ -15,16 +15,17 @@
     <p:sldId id="262" r:id="rId6"/>
     <p:sldId id="261" r:id="rId7"/>
     <p:sldId id="264" r:id="rId8"/>
-    <p:sldId id="265" r:id="rId9"/>
-    <p:sldId id="270" r:id="rId10"/>
-    <p:sldId id="259" r:id="rId11"/>
-    <p:sldId id="271" r:id="rId12"/>
-    <p:sldId id="272" r:id="rId13"/>
-    <p:sldId id="273" r:id="rId14"/>
-    <p:sldId id="274" r:id="rId15"/>
-    <p:sldId id="275" r:id="rId16"/>
-    <p:sldId id="276" r:id="rId17"/>
-    <p:sldId id="277" r:id="rId18"/>
+    <p:sldId id="278" r:id="rId9"/>
+    <p:sldId id="265" r:id="rId10"/>
+    <p:sldId id="270" r:id="rId11"/>
+    <p:sldId id="259" r:id="rId12"/>
+    <p:sldId id="271" r:id="rId13"/>
+    <p:sldId id="272" r:id="rId14"/>
+    <p:sldId id="273" r:id="rId15"/>
+    <p:sldId id="274" r:id="rId16"/>
+    <p:sldId id="275" r:id="rId17"/>
+    <p:sldId id="276" r:id="rId18"/>
+    <p:sldId id="277" r:id="rId19"/>
   </p:sldIdLst>
   <p:sldSz cx="12192000" cy="6858000"/>
   <p:notesSz cx="6858000" cy="9144000"/>
@@ -123,6 +124,11 @@
       </a:defRPr>
     </a:lvl9pPr>
   </p:defaultTextStyle>
+  <p:extLst>
+    <p:ext uri="{EFAFB233-063F-42B5-8137-9DF3F51BA10A}">
+      <p15:sldGuideLst xmlns:p15="http://schemas.microsoft.com/office/powerpoint/2012/main"/>
+    </p:ext>
+  </p:extLst>
 </p:presentation>
 </file>
 
@@ -4025,6 +4031,1470 @@
           <a:chExt cx="0" cy="0"/>
         </a:xfrm>
       </p:grpSpPr>
+      <p:pic>
+        <p:nvPicPr>
+          <p:cNvPr id="6" name="Picture 5"/>
+          <p:cNvPicPr>
+            <a:picLocks noChangeAspect="1"/>
+          </p:cNvPicPr>
+          <p:nvPr/>
+        </p:nvPicPr>
+        <p:blipFill rotWithShape="1">
+          <a:blip r:embed="rId2"/>
+          <a:srcRect l="43390" t="20221" r="9273" b="57059"/>
+          <a:stretch/>
+        </p:blipFill>
+        <p:spPr>
+          <a:xfrm>
+            <a:off x="4447732" y="5752273"/>
+            <a:ext cx="3583745" cy="967612"/>
+          </a:xfrm>
+          <a:prstGeom prst="rect">
+            <a:avLst/>
+          </a:prstGeom>
+        </p:spPr>
+      </p:pic>
+      <p:sp>
+        <p:nvSpPr>
+          <p:cNvPr id="11" name="TextBox 10"/>
+          <p:cNvSpPr txBox="1"/>
+          <p:nvPr/>
+        </p:nvSpPr>
+        <p:spPr>
+          <a:xfrm>
+            <a:off x="5508521" y="322913"/>
+            <a:ext cx="2791405" cy="461665"/>
+          </a:xfrm>
+          <a:prstGeom prst="rect">
+            <a:avLst/>
+          </a:prstGeom>
+          <a:noFill/>
+        </p:spPr>
+        <p:txBody>
+          <a:bodyPr wrap="none" rtlCol="0">
+            <a:spAutoFit/>
+          </a:bodyPr>
+          <a:lstStyle/>
+          <a:p>
+            <a:r>
+              <a:rPr lang="en-US" sz="2400" b="1" dirty="0"/>
+              <a:t>Bay G Launch Mirror</a:t>
+            </a:r>
+          </a:p>
+        </p:txBody>
+      </p:sp>
+      <p:sp>
+        <p:nvSpPr>
+          <p:cNvPr id="12" name="TextBox 11"/>
+          <p:cNvSpPr txBox="1"/>
+          <p:nvPr/>
+        </p:nvSpPr>
+        <p:spPr>
+          <a:xfrm>
+            <a:off x="4544834" y="2683814"/>
+            <a:ext cx="1791260" cy="461665"/>
+          </a:xfrm>
+          <a:prstGeom prst="rect">
+            <a:avLst/>
+          </a:prstGeom>
+          <a:noFill/>
+        </p:spPr>
+        <p:txBody>
+          <a:bodyPr wrap="none" rtlCol="0">
+            <a:spAutoFit/>
+          </a:bodyPr>
+          <a:lstStyle/>
+          <a:p>
+            <a:r>
+              <a:rPr lang="en-US" sz="2400" b="1"/>
+              <a:t>Torus Center</a:t>
+            </a:r>
+          </a:p>
+        </p:txBody>
+      </p:sp>
+      <p:sp>
+        <p:nvSpPr>
+          <p:cNvPr id="19" name="TextBox 18"/>
+          <p:cNvSpPr txBox="1"/>
+          <p:nvPr/>
+        </p:nvSpPr>
+        <p:spPr>
+          <a:xfrm>
+            <a:off x="6890438" y="6327042"/>
+            <a:ext cx="1262910" cy="461665"/>
+          </a:xfrm>
+          <a:prstGeom prst="rect">
+            <a:avLst/>
+          </a:prstGeom>
+          <a:noFill/>
+        </p:spPr>
+        <p:txBody>
+          <a:bodyPr wrap="none" rtlCol="0">
+            <a:spAutoFit/>
+          </a:bodyPr>
+          <a:lstStyle/>
+          <a:p>
+            <a:r>
+              <a:rPr lang="en-US" sz="2400" b="1"/>
+              <a:t>Window</a:t>
+            </a:r>
+          </a:p>
+        </p:txBody>
+      </p:sp>
+      <p:sp>
+        <p:nvSpPr>
+          <p:cNvPr id="20" name="Rectangle 19"/>
+          <p:cNvSpPr/>
+          <p:nvPr/>
+        </p:nvSpPr>
+        <p:spPr>
+          <a:xfrm>
+            <a:off x="6024363" y="6477454"/>
+            <a:ext cx="796923" cy="94069"/>
+          </a:xfrm>
+          <a:prstGeom prst="rect">
+            <a:avLst/>
+          </a:prstGeom>
+        </p:spPr>
+        <p:style>
+          <a:lnRef idx="2">
+            <a:schemeClr val="accent1">
+              <a:shade val="50000"/>
+            </a:schemeClr>
+          </a:lnRef>
+          <a:fillRef idx="1">
+            <a:schemeClr val="accent1"/>
+          </a:fillRef>
+          <a:effectRef idx="0">
+            <a:schemeClr val="accent1"/>
+          </a:effectRef>
+          <a:fontRef idx="minor">
+            <a:schemeClr val="lt1"/>
+          </a:fontRef>
+        </p:style>
+        <p:txBody>
+          <a:bodyPr rtlCol="0" anchor="ctr"/>
+          <a:lstStyle/>
+          <a:p>
+            <a:pPr algn="ctr"/>
+            <a:endParaRPr lang="en-US"/>
+          </a:p>
+        </p:txBody>
+      </p:sp>
+      <p:sp>
+        <p:nvSpPr>
+          <p:cNvPr id="41" name="TextBox 40"/>
+          <p:cNvSpPr txBox="1"/>
+          <p:nvPr/>
+        </p:nvSpPr>
+        <p:spPr>
+          <a:xfrm>
+            <a:off x="212434" y="68234"/>
+            <a:ext cx="5514326" cy="890115"/>
+          </a:xfrm>
+          <a:prstGeom prst="rect">
+            <a:avLst/>
+          </a:prstGeom>
+          <a:noFill/>
+        </p:spPr>
+        <p:txBody>
+          <a:bodyPr wrap="square" rtlCol="0">
+            <a:spAutoFit/>
+          </a:bodyPr>
+          <a:lstStyle/>
+          <a:p>
+            <a:pPr>
+              <a:lnSpc>
+                <a:spcPct val="80000"/>
+              </a:lnSpc>
+            </a:pPr>
+            <a:r>
+              <a:rPr lang="en-US" sz="3200" b="1" dirty="0">
+                <a:solidFill>
+                  <a:srgbClr val="FF0000"/>
+                </a:solidFill>
+              </a:rPr>
+              <a:t>NSTX-U High-k Scattering Launch Geometry</a:t>
+            </a:r>
+          </a:p>
+        </p:txBody>
+      </p:sp>
+      <p:cxnSp>
+        <p:nvCxnSpPr>
+          <p:cNvPr id="42" name="Straight Connector 41"/>
+          <p:cNvCxnSpPr/>
+          <p:nvPr/>
+        </p:nvCxnSpPr>
+        <p:spPr>
+          <a:xfrm flipH="1" flipV="1">
+            <a:off x="6125356" y="3194531"/>
+            <a:ext cx="0" cy="3383280"/>
+          </a:xfrm>
+          <a:prstGeom prst="line">
+            <a:avLst/>
+          </a:prstGeom>
+          <a:ln w="25400">
+            <a:solidFill>
+              <a:srgbClr val="FF0000"/>
+            </a:solidFill>
+          </a:ln>
+        </p:spPr>
+        <p:style>
+          <a:lnRef idx="1">
+            <a:schemeClr val="accent1"/>
+          </a:lnRef>
+          <a:fillRef idx="0">
+            <a:schemeClr val="accent1"/>
+          </a:fillRef>
+          <a:effectRef idx="0">
+            <a:schemeClr val="accent1"/>
+          </a:effectRef>
+          <a:fontRef idx="minor">
+            <a:schemeClr val="tx1"/>
+          </a:fontRef>
+        </p:style>
+      </p:cxnSp>
+      <p:cxnSp>
+        <p:nvCxnSpPr>
+          <p:cNvPr id="45" name="Straight Connector 44"/>
+          <p:cNvCxnSpPr/>
+          <p:nvPr/>
+        </p:nvCxnSpPr>
+        <p:spPr>
+          <a:xfrm rot="780000" flipV="1">
+            <a:off x="6615591" y="4766159"/>
+            <a:ext cx="0" cy="1828800"/>
+          </a:xfrm>
+          <a:prstGeom prst="line">
+            <a:avLst/>
+          </a:prstGeom>
+          <a:ln w="25400">
+            <a:solidFill>
+              <a:srgbClr val="FF0000"/>
+            </a:solidFill>
+          </a:ln>
+        </p:spPr>
+        <p:style>
+          <a:lnRef idx="1">
+            <a:schemeClr val="accent1"/>
+          </a:lnRef>
+          <a:fillRef idx="0">
+            <a:schemeClr val="accent1"/>
+          </a:fillRef>
+          <a:effectRef idx="0">
+            <a:schemeClr val="accent1"/>
+          </a:effectRef>
+          <a:fontRef idx="minor">
+            <a:schemeClr val="tx1"/>
+          </a:fontRef>
+        </p:style>
+      </p:cxnSp>
+      <p:sp>
+        <p:nvSpPr>
+          <p:cNvPr id="46" name="TextBox 45"/>
+          <p:cNvSpPr txBox="1"/>
+          <p:nvPr/>
+        </p:nvSpPr>
+        <p:spPr>
+          <a:xfrm>
+            <a:off x="6904223" y="4440772"/>
+            <a:ext cx="1807299" cy="690638"/>
+          </a:xfrm>
+          <a:prstGeom prst="rect">
+            <a:avLst/>
+          </a:prstGeom>
+          <a:noFill/>
+        </p:spPr>
+        <p:txBody>
+          <a:bodyPr wrap="square" rtlCol="0">
+            <a:spAutoFit/>
+          </a:bodyPr>
+          <a:lstStyle/>
+          <a:p>
+            <a:pPr>
+              <a:lnSpc>
+                <a:spcPct val="80000"/>
+              </a:lnSpc>
+            </a:pPr>
+            <a:r>
+              <a:rPr lang="en-US" sz="2400" b="1" dirty="0">
+                <a:solidFill>
+                  <a:srgbClr val="0070C0"/>
+                </a:solidFill>
+              </a:rPr>
+              <a:t>Interaction Region (IR)</a:t>
+            </a:r>
+          </a:p>
+        </p:txBody>
+      </p:sp>
+      <p:cxnSp>
+        <p:nvCxnSpPr>
+          <p:cNvPr id="47" name="Straight Connector 46"/>
+          <p:cNvCxnSpPr>
+            <a:stCxn id="44" idx="4"/>
+          </p:cNvCxnSpPr>
+          <p:nvPr/>
+        </p:nvCxnSpPr>
+        <p:spPr>
+          <a:xfrm flipH="1" flipV="1">
+            <a:off x="6162924" y="3218733"/>
+            <a:ext cx="640080" cy="1554480"/>
+          </a:xfrm>
+          <a:prstGeom prst="line">
+            <a:avLst/>
+          </a:prstGeom>
+          <a:ln w="25400">
+            <a:solidFill>
+              <a:srgbClr val="0070C0"/>
+            </a:solidFill>
+            <a:headEnd type="triangle" w="lg" len="lg"/>
+            <a:tailEnd type="none"/>
+          </a:ln>
+        </p:spPr>
+        <p:style>
+          <a:lnRef idx="1">
+            <a:schemeClr val="accent1"/>
+          </a:lnRef>
+          <a:fillRef idx="0">
+            <a:schemeClr val="accent1"/>
+          </a:fillRef>
+          <a:effectRef idx="0">
+            <a:schemeClr val="accent1"/>
+          </a:effectRef>
+          <a:fontRef idx="minor">
+            <a:schemeClr val="tx1"/>
+          </a:fontRef>
+        </p:style>
+      </p:cxnSp>
+      <p:cxnSp>
+        <p:nvCxnSpPr>
+          <p:cNvPr id="48" name="Straight Connector 47"/>
+          <p:cNvCxnSpPr/>
+          <p:nvPr/>
+        </p:nvCxnSpPr>
+        <p:spPr>
+          <a:xfrm rot="1200000" flipH="1" flipV="1">
+            <a:off x="7618074" y="450448"/>
+            <a:ext cx="0" cy="4480560"/>
+          </a:xfrm>
+          <a:prstGeom prst="line">
+            <a:avLst/>
+          </a:prstGeom>
+          <a:ln w="25400">
+            <a:solidFill>
+              <a:srgbClr val="FF0000"/>
+            </a:solidFill>
+          </a:ln>
+        </p:spPr>
+        <p:style>
+          <a:lnRef idx="1">
+            <a:schemeClr val="accent1"/>
+          </a:lnRef>
+          <a:fillRef idx="0">
+            <a:schemeClr val="accent1"/>
+          </a:fillRef>
+          <a:effectRef idx="0">
+            <a:schemeClr val="accent1"/>
+          </a:effectRef>
+          <a:fontRef idx="minor">
+            <a:schemeClr val="tx1"/>
+          </a:fontRef>
+        </p:style>
+      </p:cxnSp>
+      <p:sp>
+        <p:nvSpPr>
+          <p:cNvPr id="14" name="Oval 13"/>
+          <p:cNvSpPr/>
+          <p:nvPr/>
+        </p:nvSpPr>
+        <p:spPr>
+          <a:xfrm>
+            <a:off x="8294694" y="501857"/>
+            <a:ext cx="182880" cy="182880"/>
+          </a:xfrm>
+          <a:prstGeom prst="ellipse">
+            <a:avLst/>
+          </a:prstGeom>
+          <a:solidFill>
+            <a:schemeClr val="tx1"/>
+          </a:solidFill>
+        </p:spPr>
+        <p:style>
+          <a:lnRef idx="2">
+            <a:schemeClr val="accent1">
+              <a:shade val="50000"/>
+            </a:schemeClr>
+          </a:lnRef>
+          <a:fillRef idx="1">
+            <a:schemeClr val="accent1"/>
+          </a:fillRef>
+          <a:effectRef idx="0">
+            <a:schemeClr val="accent1"/>
+          </a:effectRef>
+          <a:fontRef idx="minor">
+            <a:schemeClr val="lt1"/>
+          </a:fontRef>
+        </p:style>
+        <p:txBody>
+          <a:bodyPr rtlCol="0" anchor="ctr"/>
+          <a:lstStyle/>
+          <a:p>
+            <a:pPr algn="ctr"/>
+            <a:endParaRPr lang="en-US"/>
+          </a:p>
+        </p:txBody>
+      </p:sp>
+      <p:cxnSp>
+        <p:nvCxnSpPr>
+          <p:cNvPr id="43" name="Straight Connector 42"/>
+          <p:cNvCxnSpPr/>
+          <p:nvPr/>
+        </p:nvCxnSpPr>
+        <p:spPr>
+          <a:xfrm rot="2460000" flipH="1" flipV="1">
+            <a:off x="7265167" y="170170"/>
+            <a:ext cx="0" cy="3474720"/>
+          </a:xfrm>
+          <a:prstGeom prst="line">
+            <a:avLst/>
+          </a:prstGeom>
+          <a:ln w="25400">
+            <a:solidFill>
+              <a:srgbClr val="FF0000"/>
+            </a:solidFill>
+          </a:ln>
+        </p:spPr>
+        <p:style>
+          <a:lnRef idx="1">
+            <a:schemeClr val="accent1"/>
+          </a:lnRef>
+          <a:fillRef idx="0">
+            <a:schemeClr val="accent1"/>
+          </a:fillRef>
+          <a:effectRef idx="0">
+            <a:schemeClr val="accent1"/>
+          </a:effectRef>
+          <a:fontRef idx="minor">
+            <a:schemeClr val="tx1"/>
+          </a:fontRef>
+        </p:style>
+      </p:cxnSp>
+      <p:sp>
+        <p:nvSpPr>
+          <p:cNvPr id="18" name="Oval 17"/>
+          <p:cNvSpPr/>
+          <p:nvPr/>
+        </p:nvSpPr>
+        <p:spPr>
+          <a:xfrm>
+            <a:off x="6024364" y="3095580"/>
+            <a:ext cx="182880" cy="182880"/>
+          </a:xfrm>
+          <a:prstGeom prst="ellipse">
+            <a:avLst/>
+          </a:prstGeom>
+          <a:solidFill>
+            <a:schemeClr val="tx1"/>
+          </a:solidFill>
+        </p:spPr>
+        <p:style>
+          <a:lnRef idx="2">
+            <a:schemeClr val="accent1">
+              <a:shade val="50000"/>
+            </a:schemeClr>
+          </a:lnRef>
+          <a:fillRef idx="1">
+            <a:schemeClr val="accent1"/>
+          </a:fillRef>
+          <a:effectRef idx="0">
+            <a:schemeClr val="accent1"/>
+          </a:effectRef>
+          <a:fontRef idx="minor">
+            <a:schemeClr val="lt1"/>
+          </a:fontRef>
+        </p:style>
+        <p:txBody>
+          <a:bodyPr rtlCol="0" anchor="ctr"/>
+          <a:lstStyle/>
+          <a:p>
+            <a:pPr algn="ctr"/>
+            <a:endParaRPr lang="en-US"/>
+          </a:p>
+        </p:txBody>
+      </p:sp>
+      <p:sp>
+        <p:nvSpPr>
+          <p:cNvPr id="44" name="Oval 43"/>
+          <p:cNvSpPr/>
+          <p:nvPr/>
+        </p:nvSpPr>
+        <p:spPr>
+          <a:xfrm>
+            <a:off x="6736322" y="4694651"/>
+            <a:ext cx="182880" cy="182880"/>
+          </a:xfrm>
+          <a:prstGeom prst="ellipse">
+            <a:avLst/>
+          </a:prstGeom>
+          <a:solidFill>
+            <a:schemeClr val="tx1"/>
+          </a:solidFill>
+        </p:spPr>
+        <p:style>
+          <a:lnRef idx="2">
+            <a:schemeClr val="accent1">
+              <a:shade val="50000"/>
+            </a:schemeClr>
+          </a:lnRef>
+          <a:fillRef idx="1">
+            <a:schemeClr val="accent1"/>
+          </a:fillRef>
+          <a:effectRef idx="0">
+            <a:schemeClr val="accent1"/>
+          </a:effectRef>
+          <a:fontRef idx="minor">
+            <a:schemeClr val="lt1"/>
+          </a:fontRef>
+        </p:style>
+        <p:txBody>
+          <a:bodyPr rtlCol="0" anchor="ctr"/>
+          <a:lstStyle/>
+          <a:p>
+            <a:pPr algn="ctr"/>
+            <a:endParaRPr lang="en-US"/>
+          </a:p>
+        </p:txBody>
+      </p:sp>
+      <p:sp>
+        <p:nvSpPr>
+          <p:cNvPr id="49" name="TextBox 48"/>
+          <p:cNvSpPr txBox="1"/>
+          <p:nvPr/>
+        </p:nvSpPr>
+        <p:spPr>
+          <a:xfrm>
+            <a:off x="6553576" y="3630593"/>
+            <a:ext cx="498855" cy="461665"/>
+          </a:xfrm>
+          <a:prstGeom prst="rect">
+            <a:avLst/>
+          </a:prstGeom>
+          <a:noFill/>
+        </p:spPr>
+        <p:txBody>
+          <a:bodyPr wrap="none" rtlCol="0">
+            <a:spAutoFit/>
+          </a:bodyPr>
+          <a:lstStyle/>
+          <a:p>
+            <a:r>
+              <a:rPr lang="el-GR" sz="2400" b="1">
+                <a:solidFill>
+                  <a:srgbClr val="FF0000"/>
+                </a:solidFill>
+              </a:rPr>
+              <a:t>ψ</a:t>
+            </a:r>
+            <a:r>
+              <a:rPr lang="en-US" sz="2400" b="1" baseline="-25000">
+                <a:solidFill>
+                  <a:srgbClr val="FF0000"/>
+                </a:solidFill>
+              </a:rPr>
+              <a:t>L</a:t>
+            </a:r>
+          </a:p>
+        </p:txBody>
+      </p:sp>
+      <p:sp>
+        <p:nvSpPr>
+          <p:cNvPr id="50" name="Arc 49"/>
+          <p:cNvSpPr/>
+          <p:nvPr/>
+        </p:nvSpPr>
+        <p:spPr>
+          <a:xfrm>
+            <a:off x="6179252" y="4077426"/>
+            <a:ext cx="1345201" cy="1420968"/>
+          </a:xfrm>
+          <a:prstGeom prst="arc">
+            <a:avLst>
+              <a:gd name="adj1" fmla="val 14767857"/>
+              <a:gd name="adj2" fmla="val 17347294"/>
+            </a:avLst>
+          </a:prstGeom>
+          <a:ln w="25400">
+            <a:solidFill>
+              <a:srgbClr val="FF0000"/>
+            </a:solidFill>
+            <a:tailEnd type="triangle" w="lg" len="lg"/>
+          </a:ln>
+        </p:spPr>
+        <p:style>
+          <a:lnRef idx="1">
+            <a:schemeClr val="accent1"/>
+          </a:lnRef>
+          <a:fillRef idx="0">
+            <a:schemeClr val="accent1"/>
+          </a:fillRef>
+          <a:effectRef idx="0">
+            <a:schemeClr val="accent1"/>
+          </a:effectRef>
+          <a:fontRef idx="minor">
+            <a:schemeClr val="tx1"/>
+          </a:fontRef>
+        </p:style>
+        <p:txBody>
+          <a:bodyPr rtlCol="0" anchor="ctr"/>
+          <a:lstStyle/>
+          <a:p>
+            <a:pPr algn="ctr"/>
+            <a:endParaRPr lang="en-US"/>
+          </a:p>
+        </p:txBody>
+      </p:sp>
+      <p:sp>
+        <p:nvSpPr>
+          <p:cNvPr id="51" name="TextBox 50"/>
+          <p:cNvSpPr txBox="1"/>
+          <p:nvPr/>
+        </p:nvSpPr>
+        <p:spPr>
+          <a:xfrm>
+            <a:off x="6524626" y="1637699"/>
+            <a:ext cx="623889" cy="461665"/>
+          </a:xfrm>
+          <a:prstGeom prst="rect">
+            <a:avLst/>
+          </a:prstGeom>
+          <a:noFill/>
+        </p:spPr>
+        <p:txBody>
+          <a:bodyPr wrap="none" rtlCol="0">
+            <a:spAutoFit/>
+          </a:bodyPr>
+          <a:lstStyle/>
+          <a:p>
+            <a:r>
+              <a:rPr lang="en-US" sz="2400" b="1">
+                <a:solidFill>
+                  <a:srgbClr val="FF0000"/>
+                </a:solidFill>
+              </a:rPr>
+              <a:t>R</a:t>
+            </a:r>
+            <a:r>
+              <a:rPr lang="en-US" sz="2400" b="1" baseline="-25000">
+                <a:solidFill>
+                  <a:srgbClr val="FF0000"/>
+                </a:solidFill>
+              </a:rPr>
+              <a:t>LM</a:t>
+            </a:r>
+          </a:p>
+        </p:txBody>
+      </p:sp>
+      <p:sp>
+        <p:nvSpPr>
+          <p:cNvPr id="52" name="TextBox 51"/>
+          <p:cNvSpPr txBox="1"/>
+          <p:nvPr/>
+        </p:nvSpPr>
+        <p:spPr>
+          <a:xfrm>
+            <a:off x="7525406" y="2720843"/>
+            <a:ext cx="572593" cy="461665"/>
+          </a:xfrm>
+          <a:prstGeom prst="rect">
+            <a:avLst/>
+          </a:prstGeom>
+          <a:noFill/>
+        </p:spPr>
+        <p:txBody>
+          <a:bodyPr wrap="none" rtlCol="0">
+            <a:spAutoFit/>
+          </a:bodyPr>
+          <a:lstStyle/>
+          <a:p>
+            <a:r>
+              <a:rPr lang="en-US" sz="2400" b="1">
+                <a:solidFill>
+                  <a:srgbClr val="FF0000"/>
+                </a:solidFill>
+              </a:rPr>
+              <a:t>z</a:t>
+            </a:r>
+            <a:r>
+              <a:rPr lang="en-US" sz="2400" b="1" baseline="-25000">
+                <a:solidFill>
+                  <a:srgbClr val="FF0000"/>
+                </a:solidFill>
+              </a:rPr>
+              <a:t>LM</a:t>
+            </a:r>
+          </a:p>
+        </p:txBody>
+      </p:sp>
+      <p:sp>
+        <p:nvSpPr>
+          <p:cNvPr id="53" name="TextBox 52"/>
+          <p:cNvSpPr txBox="1"/>
+          <p:nvPr/>
+        </p:nvSpPr>
+        <p:spPr>
+          <a:xfrm>
+            <a:off x="6224750" y="4188404"/>
+            <a:ext cx="527709" cy="461665"/>
+          </a:xfrm>
+          <a:prstGeom prst="rect">
+            <a:avLst/>
+          </a:prstGeom>
+          <a:noFill/>
+        </p:spPr>
+        <p:txBody>
+          <a:bodyPr wrap="none" rtlCol="0">
+            <a:spAutoFit/>
+          </a:bodyPr>
+          <a:lstStyle/>
+          <a:p>
+            <a:r>
+              <a:rPr lang="en-US" sz="2400" b="1">
+                <a:solidFill>
+                  <a:srgbClr val="FF0000"/>
+                </a:solidFill>
+              </a:rPr>
+              <a:t>R</a:t>
+            </a:r>
+            <a:r>
+              <a:rPr lang="en-US" sz="2400" b="1" baseline="-25000">
+                <a:solidFill>
+                  <a:srgbClr val="FF0000"/>
+                </a:solidFill>
+              </a:rPr>
+              <a:t>IR</a:t>
+            </a:r>
+          </a:p>
+        </p:txBody>
+      </p:sp>
+      <p:sp>
+        <p:nvSpPr>
+          <p:cNvPr id="54" name="TextBox 53"/>
+          <p:cNvSpPr txBox="1"/>
+          <p:nvPr/>
+        </p:nvSpPr>
+        <p:spPr>
+          <a:xfrm>
+            <a:off x="5500317" y="4749834"/>
+            <a:ext cx="657681" cy="461665"/>
+          </a:xfrm>
+          <a:prstGeom prst="rect">
+            <a:avLst/>
+          </a:prstGeom>
+          <a:noFill/>
+        </p:spPr>
+        <p:txBody>
+          <a:bodyPr wrap="none" rtlCol="0">
+            <a:spAutoFit/>
+          </a:bodyPr>
+          <a:lstStyle/>
+          <a:p>
+            <a:r>
+              <a:rPr lang="en-US" sz="2400" b="1">
+                <a:solidFill>
+                  <a:srgbClr val="FF0000"/>
+                </a:solidFill>
+              </a:rPr>
+              <a:t>R</a:t>
+            </a:r>
+            <a:r>
+              <a:rPr lang="en-US" sz="2400" b="1" baseline="-25000">
+                <a:solidFill>
+                  <a:srgbClr val="FF0000"/>
+                </a:solidFill>
+              </a:rPr>
+              <a:t>RW</a:t>
+            </a:r>
+          </a:p>
+        </p:txBody>
+      </p:sp>
+      <p:sp>
+        <p:nvSpPr>
+          <p:cNvPr id="55" name="Arc 54"/>
+          <p:cNvSpPr/>
+          <p:nvPr/>
+        </p:nvSpPr>
+        <p:spPr>
+          <a:xfrm rot="-5400000" flipV="1">
+            <a:off x="5714018" y="2799666"/>
+            <a:ext cx="791169" cy="765685"/>
+          </a:xfrm>
+          <a:prstGeom prst="arc">
+            <a:avLst>
+              <a:gd name="adj1" fmla="val 10937271"/>
+              <a:gd name="adj2" fmla="val 18920686"/>
+            </a:avLst>
+          </a:prstGeom>
+          <a:ln w="25400">
+            <a:solidFill>
+              <a:srgbClr val="FF0000"/>
+            </a:solidFill>
+            <a:tailEnd type="triangle" w="lg" len="lg"/>
+          </a:ln>
+        </p:spPr>
+        <p:style>
+          <a:lnRef idx="1">
+            <a:schemeClr val="accent1"/>
+          </a:lnRef>
+          <a:fillRef idx="0">
+            <a:schemeClr val="accent1"/>
+          </a:fillRef>
+          <a:effectRef idx="0">
+            <a:schemeClr val="accent1"/>
+          </a:effectRef>
+          <a:fontRef idx="minor">
+            <a:schemeClr val="tx1"/>
+          </a:fontRef>
+        </p:style>
+        <p:txBody>
+          <a:bodyPr rtlCol="0" anchor="ctr"/>
+          <a:lstStyle/>
+          <a:p>
+            <a:pPr algn="ctr"/>
+            <a:endParaRPr lang="en-US"/>
+          </a:p>
+        </p:txBody>
+      </p:sp>
+      <p:sp>
+        <p:nvSpPr>
+          <p:cNvPr id="56" name="TextBox 55"/>
+          <p:cNvSpPr txBox="1"/>
+          <p:nvPr/>
+        </p:nvSpPr>
+        <p:spPr>
+          <a:xfrm>
+            <a:off x="5500317" y="3494754"/>
+            <a:ext cx="652743" cy="461665"/>
+          </a:xfrm>
+          <a:prstGeom prst="rect">
+            <a:avLst/>
+          </a:prstGeom>
+          <a:noFill/>
+        </p:spPr>
+        <p:txBody>
+          <a:bodyPr wrap="none" rtlCol="0">
+            <a:spAutoFit/>
+          </a:bodyPr>
+          <a:lstStyle/>
+          <a:p>
+            <a:r>
+              <a:rPr lang="el-GR" sz="2400" b="1">
+                <a:solidFill>
+                  <a:srgbClr val="FF0000"/>
+                </a:solidFill>
+              </a:rPr>
+              <a:t>ψ</a:t>
+            </a:r>
+            <a:r>
+              <a:rPr lang="en-US" sz="2400" b="1" baseline="-25000">
+                <a:solidFill>
+                  <a:srgbClr val="FF0000"/>
+                </a:solidFill>
+              </a:rPr>
+              <a:t>RA</a:t>
+            </a:r>
+          </a:p>
+        </p:txBody>
+      </p:sp>
+      <p:sp>
+        <p:nvSpPr>
+          <p:cNvPr id="57" name="Arc 56"/>
+          <p:cNvSpPr/>
+          <p:nvPr/>
+        </p:nvSpPr>
+        <p:spPr>
+          <a:xfrm rot="-5400000" flipV="1">
+            <a:off x="5523208" y="2589087"/>
+            <a:ext cx="1179854" cy="1135530"/>
+          </a:xfrm>
+          <a:prstGeom prst="arc">
+            <a:avLst>
+              <a:gd name="adj1" fmla="val 10937271"/>
+              <a:gd name="adj2" fmla="val 12329916"/>
+            </a:avLst>
+          </a:prstGeom>
+          <a:ln w="25400">
+            <a:solidFill>
+              <a:srgbClr val="FF0000"/>
+            </a:solidFill>
+            <a:tailEnd type="triangle" w="lg" len="lg"/>
+          </a:ln>
+        </p:spPr>
+        <p:style>
+          <a:lnRef idx="1">
+            <a:schemeClr val="accent1"/>
+          </a:lnRef>
+          <a:fillRef idx="0">
+            <a:schemeClr val="accent1"/>
+          </a:fillRef>
+          <a:effectRef idx="0">
+            <a:schemeClr val="accent1"/>
+          </a:effectRef>
+          <a:fontRef idx="minor">
+            <a:schemeClr val="tx1"/>
+          </a:fontRef>
+        </p:style>
+        <p:txBody>
+          <a:bodyPr rtlCol="0" anchor="ctr"/>
+          <a:lstStyle/>
+          <a:p>
+            <a:pPr algn="ctr"/>
+            <a:endParaRPr lang="en-US"/>
+          </a:p>
+        </p:txBody>
+      </p:sp>
+      <p:sp>
+        <p:nvSpPr>
+          <p:cNvPr id="58" name="TextBox 57"/>
+          <p:cNvSpPr txBox="1"/>
+          <p:nvPr/>
+        </p:nvSpPr>
+        <p:spPr>
+          <a:xfrm>
+            <a:off x="277625" y="1301846"/>
+            <a:ext cx="4786788" cy="4385816"/>
+          </a:xfrm>
+          <a:prstGeom prst="rect">
+            <a:avLst/>
+          </a:prstGeom>
+          <a:noFill/>
+        </p:spPr>
+        <p:txBody>
+          <a:bodyPr wrap="square" rtlCol="0">
+            <a:spAutoFit/>
+          </a:bodyPr>
+          <a:lstStyle/>
+          <a:p>
+            <a:pPr marL="512763" indent="-512763">
+              <a:lnSpc>
+                <a:spcPct val="90000"/>
+              </a:lnSpc>
+              <a:spcBef>
+                <a:spcPts val="900"/>
+              </a:spcBef>
+            </a:pPr>
+            <a:r>
+              <a:rPr lang="en-US" sz="2000" dirty="0">
+                <a:solidFill>
+                  <a:schemeClr val="bg2">
+                    <a:lumMod val="75000"/>
+                  </a:schemeClr>
+                </a:solidFill>
+              </a:rPr>
+              <a:t>R</a:t>
+            </a:r>
+            <a:r>
+              <a:rPr lang="en-US" sz="2000" baseline="-25000" dirty="0">
+                <a:solidFill>
+                  <a:schemeClr val="bg2">
+                    <a:lumMod val="75000"/>
+                  </a:schemeClr>
+                </a:solidFill>
+              </a:rPr>
+              <a:t>RW</a:t>
+            </a:r>
+            <a:r>
+              <a:rPr lang="en-US" sz="2000" dirty="0">
+                <a:solidFill>
+                  <a:schemeClr val="bg2">
+                    <a:lumMod val="75000"/>
+                  </a:schemeClr>
+                </a:solidFill>
+              </a:rPr>
+              <a:t> = major radius of vacuum window</a:t>
+            </a:r>
+          </a:p>
+          <a:p>
+            <a:pPr marL="512763" indent="-512763">
+              <a:lnSpc>
+                <a:spcPct val="90000"/>
+              </a:lnSpc>
+              <a:spcBef>
+                <a:spcPts val="900"/>
+              </a:spcBef>
+            </a:pPr>
+            <a:r>
+              <a:rPr lang="en-US" sz="2000" dirty="0">
+                <a:solidFill>
+                  <a:schemeClr val="bg2">
+                    <a:lumMod val="75000"/>
+                  </a:schemeClr>
+                </a:solidFill>
+              </a:rPr>
+              <a:t>R</a:t>
+            </a:r>
+            <a:r>
+              <a:rPr lang="en-US" sz="2000" baseline="-25000" dirty="0">
+                <a:solidFill>
+                  <a:schemeClr val="bg2">
+                    <a:lumMod val="75000"/>
+                  </a:schemeClr>
+                </a:solidFill>
+              </a:rPr>
+              <a:t>IR</a:t>
+            </a:r>
+            <a:r>
+              <a:rPr lang="en-US" sz="2000" dirty="0">
+                <a:solidFill>
+                  <a:schemeClr val="bg2">
+                    <a:lumMod val="75000"/>
+                  </a:schemeClr>
+                </a:solidFill>
+              </a:rPr>
+              <a:t> = major radius of interaction region</a:t>
+            </a:r>
+          </a:p>
+          <a:p>
+            <a:pPr marL="512763" indent="-512763">
+              <a:lnSpc>
+                <a:spcPct val="90000"/>
+              </a:lnSpc>
+              <a:spcBef>
+                <a:spcPts val="900"/>
+              </a:spcBef>
+            </a:pPr>
+            <a:r>
+              <a:rPr lang="el-GR" sz="2000" dirty="0">
+                <a:solidFill>
+                  <a:schemeClr val="bg2">
+                    <a:lumMod val="75000"/>
+                  </a:schemeClr>
+                </a:solidFill>
+              </a:rPr>
+              <a:t>ψ</a:t>
+            </a:r>
+            <a:r>
+              <a:rPr lang="en-US" sz="2000" baseline="-25000" dirty="0">
+                <a:solidFill>
+                  <a:schemeClr val="bg2">
+                    <a:lumMod val="75000"/>
+                  </a:schemeClr>
+                </a:solidFill>
+              </a:rPr>
+              <a:t>RA</a:t>
+            </a:r>
+            <a:r>
+              <a:rPr lang="en-US" sz="2000" dirty="0">
+                <a:solidFill>
+                  <a:schemeClr val="bg2">
+                    <a:lumMod val="75000"/>
+                  </a:schemeClr>
+                </a:solidFill>
+              </a:rPr>
+              <a:t> = toroidal tilt angle of interaction region (</a:t>
+            </a:r>
+            <a:r>
+              <a:rPr lang="en-US" sz="2000" dirty="0" err="1">
+                <a:solidFill>
+                  <a:schemeClr val="bg2">
+                    <a:lumMod val="75000"/>
+                  </a:schemeClr>
+                </a:solidFill>
+              </a:rPr>
+              <a:t>w.r.t.</a:t>
+            </a:r>
+            <a:r>
+              <a:rPr lang="en-US" sz="2000" dirty="0">
+                <a:solidFill>
+                  <a:schemeClr val="bg2">
+                    <a:lumMod val="75000"/>
+                  </a:schemeClr>
+                </a:solidFill>
+              </a:rPr>
+              <a:t> plane of vacuum window)</a:t>
+            </a:r>
+          </a:p>
+          <a:p>
+            <a:pPr marL="512763" indent="-512763">
+              <a:lnSpc>
+                <a:spcPct val="90000"/>
+              </a:lnSpc>
+              <a:spcBef>
+                <a:spcPts val="900"/>
+              </a:spcBef>
+            </a:pPr>
+            <a:r>
+              <a:rPr lang="en-US" sz="2000" dirty="0"/>
+              <a:t>R</a:t>
+            </a:r>
+            <a:r>
+              <a:rPr lang="en-US" sz="2000" baseline="-25000" dirty="0"/>
+              <a:t>LM</a:t>
+            </a:r>
+            <a:r>
+              <a:rPr lang="en-US" sz="2000" dirty="0"/>
+              <a:t> = major radius of launch mirror</a:t>
+            </a:r>
+            <a:br>
+              <a:rPr lang="en-US" sz="2000" dirty="0"/>
+            </a:br>
+            <a:r>
+              <a:rPr lang="en-US" sz="2000" dirty="0"/>
+              <a:t>(fixed)</a:t>
+            </a:r>
+          </a:p>
+          <a:p>
+            <a:pPr marL="512763" indent="-512763">
+              <a:lnSpc>
+                <a:spcPct val="90000"/>
+              </a:lnSpc>
+              <a:spcBef>
+                <a:spcPts val="900"/>
+              </a:spcBef>
+            </a:pPr>
+            <a:r>
+              <a:rPr lang="el-GR" sz="2000" dirty="0"/>
+              <a:t>ψ</a:t>
+            </a:r>
+            <a:r>
+              <a:rPr lang="en-US" sz="2000" baseline="-25000" dirty="0"/>
+              <a:t>LM</a:t>
+            </a:r>
+            <a:r>
+              <a:rPr lang="en-US" sz="2000" dirty="0"/>
+              <a:t> = toroidal tilt angle of launch mirror</a:t>
+            </a:r>
+            <a:br>
+              <a:rPr lang="en-US" sz="2000" dirty="0"/>
+            </a:br>
+            <a:r>
+              <a:rPr lang="en-US" sz="2000" dirty="0"/>
+              <a:t>(</a:t>
+            </a:r>
+            <a:r>
+              <a:rPr lang="en-US" sz="2000" dirty="0" err="1"/>
+              <a:t>w.r.t.</a:t>
+            </a:r>
+            <a:r>
+              <a:rPr lang="en-US" sz="2000" dirty="0"/>
+              <a:t> plane of vacuum window)</a:t>
+            </a:r>
+          </a:p>
+          <a:p>
+            <a:pPr marL="512763" indent="-512763">
+              <a:lnSpc>
+                <a:spcPct val="90000"/>
+              </a:lnSpc>
+              <a:spcBef>
+                <a:spcPts val="900"/>
+              </a:spcBef>
+            </a:pPr>
+            <a:r>
+              <a:rPr lang="en-US" sz="2000" dirty="0" err="1"/>
+              <a:t>z</a:t>
+            </a:r>
+            <a:r>
+              <a:rPr lang="en-US" sz="2000" baseline="-25000" dirty="0" err="1"/>
+              <a:t>LM</a:t>
+            </a:r>
+            <a:r>
+              <a:rPr lang="en-US" sz="2000" dirty="0"/>
+              <a:t> = distance from launch steering mirror to interaction region</a:t>
+            </a:r>
+          </a:p>
+          <a:p>
+            <a:pPr marL="512763" indent="-512763">
+              <a:lnSpc>
+                <a:spcPct val="90000"/>
+              </a:lnSpc>
+              <a:spcBef>
+                <a:spcPts val="900"/>
+              </a:spcBef>
+            </a:pPr>
+            <a:r>
+              <a:rPr lang="el-GR" sz="2000" dirty="0"/>
+              <a:t>ψ</a:t>
+            </a:r>
+            <a:r>
+              <a:rPr lang="en-US" sz="2000" baseline="-25000" dirty="0"/>
+              <a:t>L</a:t>
+            </a:r>
+            <a:r>
+              <a:rPr lang="en-US" sz="2000" dirty="0"/>
+              <a:t> = toroidal tilt angle between launch beam and Radius vector (from torus center)</a:t>
+            </a:r>
+          </a:p>
+        </p:txBody>
+      </p:sp>
+      <p:sp>
+        <p:nvSpPr>
+          <p:cNvPr id="59" name="TextBox 58"/>
+          <p:cNvSpPr txBox="1"/>
+          <p:nvPr/>
+        </p:nvSpPr>
+        <p:spPr>
+          <a:xfrm>
+            <a:off x="6440724" y="2970414"/>
+            <a:ext cx="678391" cy="461665"/>
+          </a:xfrm>
+          <a:prstGeom prst="rect">
+            <a:avLst/>
+          </a:prstGeom>
+          <a:noFill/>
+        </p:spPr>
+        <p:txBody>
+          <a:bodyPr wrap="none" rtlCol="0">
+            <a:spAutoFit/>
+          </a:bodyPr>
+          <a:lstStyle/>
+          <a:p>
+            <a:r>
+              <a:rPr lang="el-GR" sz="2400" b="1">
+                <a:solidFill>
+                  <a:srgbClr val="FF0000"/>
+                </a:solidFill>
+              </a:rPr>
+              <a:t>ψ</a:t>
+            </a:r>
+            <a:r>
+              <a:rPr lang="en-US" sz="2400" b="1" baseline="-25000">
+                <a:solidFill>
+                  <a:srgbClr val="FF0000"/>
+                </a:solidFill>
+              </a:rPr>
+              <a:t>LM</a:t>
+            </a:r>
+          </a:p>
+        </p:txBody>
+      </p:sp>
+      <p:sp>
+        <p:nvSpPr>
+          <p:cNvPr id="60" name="TextBox 59"/>
+          <p:cNvSpPr txBox="1"/>
+          <p:nvPr/>
+        </p:nvSpPr>
+        <p:spPr>
+          <a:xfrm>
+            <a:off x="7555019" y="3402859"/>
+            <a:ext cx="4444100" cy="800219"/>
+          </a:xfrm>
+          <a:prstGeom prst="rect">
+            <a:avLst/>
+          </a:prstGeom>
+          <a:noFill/>
+        </p:spPr>
+        <p:txBody>
+          <a:bodyPr wrap="square" rtlCol="0">
+            <a:spAutoFit/>
+          </a:bodyPr>
+          <a:lstStyle/>
+          <a:p>
+            <a:pPr marL="512763" indent="-512763">
+              <a:lnSpc>
+                <a:spcPct val="90000"/>
+              </a:lnSpc>
+              <a:spcBef>
+                <a:spcPts val="1200"/>
+              </a:spcBef>
+            </a:pPr>
+            <a:r>
+              <a:rPr lang="en-US" sz="2000"/>
+              <a:t>z</a:t>
+            </a:r>
+            <a:r>
+              <a:rPr lang="en-US" sz="2000" baseline="-25000"/>
+              <a:t>LM</a:t>
+            </a:r>
+            <a:r>
+              <a:rPr lang="en-US" sz="2000" baseline="30000"/>
+              <a:t>2</a:t>
+            </a:r>
+            <a:r>
+              <a:rPr lang="en-US" sz="2000"/>
+              <a:t> = R</a:t>
+            </a:r>
+            <a:r>
+              <a:rPr lang="en-US" sz="2000" baseline="-25000"/>
+              <a:t>LM</a:t>
+            </a:r>
+            <a:r>
+              <a:rPr lang="en-US" sz="2000" baseline="30000"/>
+              <a:t>2</a:t>
+            </a:r>
+            <a:r>
+              <a:rPr lang="en-US" sz="2000"/>
+              <a:t> + R</a:t>
+            </a:r>
+            <a:r>
+              <a:rPr lang="en-US" sz="2000" baseline="-25000"/>
+              <a:t>IR</a:t>
+            </a:r>
+            <a:r>
+              <a:rPr lang="en-US" sz="2000" baseline="30000"/>
+              <a:t>2</a:t>
+            </a:r>
+            <a:r>
+              <a:rPr lang="en-US" sz="2000"/>
+              <a:t> – 2R</a:t>
+            </a:r>
+            <a:r>
+              <a:rPr lang="en-US" sz="2000" baseline="-25000"/>
+              <a:t>LM</a:t>
+            </a:r>
+            <a:r>
+              <a:rPr lang="en-US" sz="2000"/>
+              <a:t>·R</a:t>
+            </a:r>
+            <a:r>
+              <a:rPr lang="en-US" sz="2000" baseline="-25000"/>
+              <a:t>IR</a:t>
+            </a:r>
+            <a:r>
+              <a:rPr lang="en-US" sz="2000"/>
+              <a:t>·cos(</a:t>
+            </a:r>
+            <a:r>
+              <a:rPr lang="el-GR" sz="2000"/>
+              <a:t>ψ</a:t>
+            </a:r>
+            <a:r>
+              <a:rPr lang="en-US" sz="2000" baseline="-25000"/>
+              <a:t>LM</a:t>
+            </a:r>
+            <a:r>
+              <a:rPr lang="en-US" sz="2000"/>
+              <a:t> - </a:t>
+            </a:r>
+            <a:r>
+              <a:rPr lang="el-GR" sz="2000"/>
+              <a:t>ψ</a:t>
+            </a:r>
+            <a:r>
+              <a:rPr lang="en-US" sz="2000" baseline="-25000"/>
+              <a:t>RA</a:t>
+            </a:r>
+            <a:r>
+              <a:rPr lang="en-US" sz="2000"/>
+              <a:t>)</a:t>
+            </a:r>
+          </a:p>
+          <a:p>
+            <a:pPr marL="512763" indent="-512763">
+              <a:lnSpc>
+                <a:spcPct val="90000"/>
+              </a:lnSpc>
+              <a:spcBef>
+                <a:spcPts val="1200"/>
+              </a:spcBef>
+            </a:pPr>
+            <a:r>
+              <a:rPr lang="el-GR" sz="2000"/>
+              <a:t>ψ</a:t>
+            </a:r>
+            <a:r>
+              <a:rPr lang="en-US" sz="2000" baseline="-25000"/>
+              <a:t>L</a:t>
+            </a:r>
+            <a:r>
+              <a:rPr lang="en-US" sz="2000"/>
+              <a:t> = sin</a:t>
+            </a:r>
+            <a:r>
+              <a:rPr lang="en-US" sz="2000" baseline="30000"/>
+              <a:t>‒1</a:t>
+            </a:r>
+            <a:r>
+              <a:rPr lang="en-US" sz="2000">
+                <a:solidFill>
+                  <a:srgbClr val="0070C0"/>
+                </a:solidFill>
+              </a:rPr>
+              <a:t>(</a:t>
+            </a:r>
+            <a:r>
+              <a:rPr lang="en-US" sz="2000"/>
+              <a:t>(R</a:t>
+            </a:r>
+            <a:r>
+              <a:rPr lang="en-US" sz="2000" baseline="-25000"/>
+              <a:t>LM</a:t>
+            </a:r>
+            <a:r>
+              <a:rPr lang="en-US" sz="2000"/>
+              <a:t>/z</a:t>
+            </a:r>
+            <a:r>
+              <a:rPr lang="en-US" sz="2000" baseline="-25000"/>
+              <a:t>LM</a:t>
+            </a:r>
+            <a:r>
+              <a:rPr lang="en-US" sz="2000"/>
+              <a:t>)·sin(</a:t>
+            </a:r>
+            <a:r>
+              <a:rPr lang="el-GR" sz="2000"/>
+              <a:t>ψ</a:t>
+            </a:r>
+            <a:r>
+              <a:rPr lang="en-US" sz="2000" baseline="-25000"/>
+              <a:t>LM</a:t>
+            </a:r>
+            <a:r>
+              <a:rPr lang="en-US" sz="2000"/>
+              <a:t> - </a:t>
+            </a:r>
+            <a:r>
+              <a:rPr lang="el-GR" sz="2000"/>
+              <a:t>ψ</a:t>
+            </a:r>
+            <a:r>
+              <a:rPr lang="en-US" sz="2000" baseline="-25000"/>
+              <a:t>RA</a:t>
+            </a:r>
+            <a:r>
+              <a:rPr lang="en-US" sz="2000"/>
+              <a:t>)</a:t>
+            </a:r>
+            <a:r>
+              <a:rPr lang="en-US" sz="2000">
+                <a:solidFill>
+                  <a:srgbClr val="0070C0"/>
+                </a:solidFill>
+              </a:rPr>
+              <a:t>)</a:t>
+            </a:r>
+          </a:p>
+        </p:txBody>
+      </p:sp>
+    </p:spTree>
+    <p:extLst>
+      <p:ext uri="{BB962C8B-B14F-4D97-AF65-F5344CB8AC3E}">
+        <p14:creationId xmlns:p14="http://schemas.microsoft.com/office/powerpoint/2010/main" val="773995941"/>
+      </p:ext>
+    </p:extLst>
+  </p:cSld>
+  <p:clrMapOvr>
+    <a:masterClrMapping/>
+  </p:clrMapOvr>
+</p:sld>
+</file>
+
+<file path=ppt/slides/slide11.xml><?xml version="1.0" encoding="utf-8"?>
+<p:sld xmlns:a="http://schemas.openxmlformats.org/drawingml/2006/main" xmlns:r="http://schemas.openxmlformats.org/officeDocument/2006/relationships" xmlns:p="http://schemas.openxmlformats.org/presentationml/2006/main">
+  <p:cSld>
+    <p:spTree>
+      <p:nvGrpSpPr>
+        <p:cNvPr id="1" name=""/>
+        <p:cNvGrpSpPr/>
+        <p:nvPr/>
+      </p:nvGrpSpPr>
+      <p:grpSpPr>
+        <a:xfrm>
+          <a:off x="0" y="0"/>
+          <a:ext cx="0" cy="0"/>
+          <a:chOff x="0" y="0"/>
+          <a:chExt cx="0" cy="0"/>
+        </a:xfrm>
+      </p:grpSpPr>
       <p:cxnSp>
         <p:nvCxnSpPr>
           <p:cNvPr id="14" name="Straight Connector 13"/>
@@ -5014,7 +6484,7 @@
 </p:sld>
 </file>
 
-<file path=ppt/slides/slide11.xml><?xml version="1.0" encoding="utf-8"?>
+<file path=ppt/slides/slide12.xml><?xml version="1.0" encoding="utf-8"?>
 <p:sld xmlns:a="http://schemas.openxmlformats.org/drawingml/2006/main" xmlns:r="http://schemas.openxmlformats.org/officeDocument/2006/relationships" xmlns:p="http://schemas.openxmlformats.org/presentationml/2006/main">
   <p:cSld>
     <p:spTree>
@@ -6249,7 +7719,7 @@
 </p:sld>
 </file>
 
-<file path=ppt/slides/slide12.xml><?xml version="1.0" encoding="utf-8"?>
+<file path=ppt/slides/slide13.xml><?xml version="1.0" encoding="utf-8"?>
 <p:sld xmlns:a="http://schemas.openxmlformats.org/drawingml/2006/main" xmlns:r="http://schemas.openxmlformats.org/officeDocument/2006/relationships" xmlns:p="http://schemas.openxmlformats.org/presentationml/2006/main">
   <p:cSld>
     <p:spTree>
@@ -6909,7 +8379,7 @@
 </p:sld>
 </file>
 
-<file path=ppt/slides/slide13.xml><?xml version="1.0" encoding="utf-8"?>
+<file path=ppt/slides/slide14.xml><?xml version="1.0" encoding="utf-8"?>
 <p:sld xmlns:a="http://schemas.openxmlformats.org/drawingml/2006/main" xmlns:r="http://schemas.openxmlformats.org/officeDocument/2006/relationships" xmlns:p="http://schemas.openxmlformats.org/presentationml/2006/main">
   <p:cSld>
     <p:spTree>
@@ -6973,7 +8443,7 @@
 </p:sld>
 </file>
 
-<file path=ppt/slides/slide14.xml><?xml version="1.0" encoding="utf-8"?>
+<file path=ppt/slides/slide15.xml><?xml version="1.0" encoding="utf-8"?>
 <p:sld xmlns:a="http://schemas.openxmlformats.org/drawingml/2006/main" xmlns:r="http://schemas.openxmlformats.org/officeDocument/2006/relationships" xmlns:p="http://schemas.openxmlformats.org/presentationml/2006/main">
   <p:cSld>
     <p:spTree>
@@ -8734,7 +10204,7 @@
 </p:sld>
 </file>
 
-<file path=ppt/slides/slide15.xml><?xml version="1.0" encoding="utf-8"?>
+<file path=ppt/slides/slide16.xml><?xml version="1.0" encoding="utf-8"?>
 <p:sld xmlns:a="http://schemas.openxmlformats.org/drawingml/2006/main" xmlns:r="http://schemas.openxmlformats.org/officeDocument/2006/relationships" xmlns:p="http://schemas.openxmlformats.org/presentationml/2006/main">
   <p:cSld>
     <p:spTree>
@@ -12096,7 +13566,7 @@
 </p:sld>
 </file>
 
-<file path=ppt/slides/slide16.xml><?xml version="1.0" encoding="utf-8"?>
+<file path=ppt/slides/slide17.xml><?xml version="1.0" encoding="utf-8"?>
 <p:sld xmlns:a="http://schemas.openxmlformats.org/drawingml/2006/main" xmlns:r="http://schemas.openxmlformats.org/officeDocument/2006/relationships" xmlns:p="http://schemas.openxmlformats.org/presentationml/2006/main">
   <p:cSld>
     <p:spTree>
@@ -15106,7 +16576,7 @@
 </p:sld>
 </file>
 
-<file path=ppt/slides/slide17.xml><?xml version="1.0" encoding="utf-8"?>
+<file path=ppt/slides/slide18.xml><?xml version="1.0" encoding="utf-8"?>
 <p:sld xmlns:a="http://schemas.openxmlformats.org/drawingml/2006/main" xmlns:r="http://schemas.openxmlformats.org/officeDocument/2006/relationships" xmlns:p="http://schemas.openxmlformats.org/presentationml/2006/main">
   <p:cSld>
     <p:spTree>
@@ -15278,15 +16748,7 @@
             </a:pPr>
             <a:r>
               <a:rPr lang="en-US" dirty="0"/>
-              <a:t>2.</a:t>
-            </a:r>
-            <a:r>
-              <a:rPr lang="en-US" sz="2800" dirty="0"/>
-              <a:t> </a:t>
-            </a:r>
-            <a:r>
-              <a:rPr lang="en-US" dirty="0"/>
-              <a:t>Get the constraint equation between the </a:t>
+              <a:t>2. Get the constraint equation between the </a:t>
             </a:r>
             <a:r>
               <a:rPr lang="en-US" sz="2400" dirty="0"/>
@@ -16905,7 +18367,7 @@
         </p:nvSpPr>
         <p:spPr>
           <a:xfrm>
-            <a:off x="6472325" y="3654567"/>
+            <a:off x="6472325" y="3682560"/>
             <a:ext cx="657681" cy="461665"/>
           </a:xfrm>
           <a:prstGeom prst="rect">
@@ -17148,8 +18610,8 @@
           </a:p>
         </p:txBody>
       </p:sp>
-      <mc:AlternateContent xmlns:mc="http://schemas.openxmlformats.org/markup-compatibility/2006">
-        <mc:Choice xmlns:a14="http://schemas.microsoft.com/office/drawing/2010/main" Requires="a14">
+      <mc:AlternateContent xmlns:mc="http://schemas.openxmlformats.org/markup-compatibility/2006" xmlns:a14="http://schemas.microsoft.com/office/drawing/2010/main">
+        <mc:Choice Requires="a14">
           <p:sp>
             <p:nvSpPr>
               <p:cNvPr id="3" name="TextBox 2">
@@ -17298,7 +18760,7 @@
             </p:txBody>
           </p:sp>
         </mc:Choice>
-        <mc:Fallback>
+        <mc:Fallback xmlns="">
           <p:sp>
             <p:nvSpPr>
               <p:cNvPr id="3" name="TextBox 2">
@@ -17402,8 +18864,8 @@
           <a:chExt cx="0" cy="0"/>
         </a:xfrm>
       </p:grpSpPr>
-      <mc:AlternateContent xmlns:mc="http://schemas.openxmlformats.org/markup-compatibility/2006">
-        <mc:Choice xmlns:a14="http://schemas.microsoft.com/office/drawing/2010/main" Requires="a14">
+      <mc:AlternateContent xmlns:mc="http://schemas.openxmlformats.org/markup-compatibility/2006" xmlns:a14="http://schemas.microsoft.com/office/drawing/2010/main">
+        <mc:Choice Requires="a14">
           <p:sp>
             <p:nvSpPr>
               <p:cNvPr id="116" name="TextBox 115">
@@ -17620,6 +19082,7 @@
                 </a:r>
               </a:p>
               <a:p>
+                <a:pPr/>
                 <a14:m>
                   <m:oMathPara xmlns:m="http://schemas.openxmlformats.org/officeDocument/2006/math">
                     <m:oMathParaPr>
@@ -17849,6 +19312,7 @@
                 <a:endParaRPr lang="en-US" altLang="zh-CN" sz="1200" b="0" dirty="0"/>
               </a:p>
               <a:p>
+                <a:pPr/>
                 <a14:m>
                   <m:oMathPara xmlns:m="http://schemas.openxmlformats.org/officeDocument/2006/math">
                     <m:oMathParaPr>
@@ -18364,6 +19828,7 @@
                 </a:r>
               </a:p>
               <a:p>
+                <a:pPr/>
                 <a14:m>
                   <m:oMathPara xmlns:m="http://schemas.openxmlformats.org/officeDocument/2006/math">
                     <m:oMathParaPr>
@@ -18479,7 +19944,7 @@
             </p:txBody>
           </p:sp>
         </mc:Choice>
-        <mc:Fallback>
+        <mc:Fallback xmlns="">
           <p:sp>
             <p:nvSpPr>
               <p:cNvPr id="116" name="TextBox 115">
@@ -18524,8 +19989,8 @@
           </p:sp>
         </mc:Fallback>
       </mc:AlternateContent>
-      <mc:AlternateContent xmlns:mc="http://schemas.openxmlformats.org/markup-compatibility/2006">
-        <mc:Choice xmlns:a14="http://schemas.microsoft.com/office/drawing/2010/main" Requires="a14">
+      <mc:AlternateContent xmlns:mc="http://schemas.openxmlformats.org/markup-compatibility/2006" xmlns:a14="http://schemas.microsoft.com/office/drawing/2010/main">
+        <mc:Choice Requires="a14">
           <p:sp>
             <p:nvSpPr>
               <p:cNvPr id="128" name="TextBox 127">
@@ -18599,7 +20064,7 @@
             </p:txBody>
           </p:sp>
         </mc:Choice>
-        <mc:Fallback>
+        <mc:Fallback xmlns="">
           <p:sp>
             <p:nvSpPr>
               <p:cNvPr id="128" name="TextBox 127">
@@ -19577,8 +21042,8 @@
             </a:p>
           </p:txBody>
         </p:sp>
-        <mc:AlternateContent xmlns:mc="http://schemas.openxmlformats.org/markup-compatibility/2006">
-          <mc:Choice xmlns:a14="http://schemas.microsoft.com/office/drawing/2010/main" Requires="a14">
+        <mc:AlternateContent xmlns:mc="http://schemas.openxmlformats.org/markup-compatibility/2006" xmlns:a14="http://schemas.microsoft.com/office/drawing/2010/main">
+          <mc:Choice Requires="a14">
             <p:sp>
               <p:nvSpPr>
                 <p:cNvPr id="15" name="TextBox 14">
@@ -19607,6 +21072,7 @@
                 </a:bodyPr>
                 <a:lstStyle/>
                 <a:p>
+                  <a:pPr/>
                   <a14:m>
                     <m:oMathPara xmlns:m="http://schemas.openxmlformats.org/officeDocument/2006/math">
                       <m:oMathParaPr>
@@ -19646,7 +21112,7 @@
               </p:txBody>
             </p:sp>
           </mc:Choice>
-          <mc:Fallback>
+          <mc:Fallback xmlns="">
             <p:sp>
               <p:nvSpPr>
                 <p:cNvPr id="15" name="TextBox 14">
@@ -19742,8 +21208,8 @@
             </a:p>
           </p:txBody>
         </p:sp>
-        <mc:AlternateContent xmlns:mc="http://schemas.openxmlformats.org/markup-compatibility/2006">
-          <mc:Choice xmlns:a14="http://schemas.microsoft.com/office/drawing/2010/main" Requires="a14">
+        <mc:AlternateContent xmlns:mc="http://schemas.openxmlformats.org/markup-compatibility/2006" xmlns:a14="http://schemas.microsoft.com/office/drawing/2010/main">
+          <mc:Choice Requires="a14">
             <p:sp>
               <p:nvSpPr>
                 <p:cNvPr id="17" name="TextBox 16">
@@ -19772,6 +21238,7 @@
                 </a:bodyPr>
                 <a:lstStyle/>
                 <a:p>
+                  <a:pPr/>
                   <a14:m>
                     <m:oMathPara xmlns:m="http://schemas.openxmlformats.org/officeDocument/2006/math">
                       <m:oMathParaPr>
@@ -19811,7 +21278,7 @@
               </p:txBody>
             </p:sp>
           </mc:Choice>
-          <mc:Fallback>
+          <mc:Fallback xmlns="">
             <p:sp>
               <p:nvSpPr>
                 <p:cNvPr id="17" name="TextBox 16">
@@ -20169,6 +21636,81 @@
           </a:fontRef>
         </p:style>
       </p:cxnSp>
+      <p:sp>
+        <p:nvSpPr>
+          <p:cNvPr id="5" name="TextBox 4">
+            <a:extLst>
+              <a:ext uri="{FF2B5EF4-FFF2-40B4-BE49-F238E27FC236}">
+                <a16:creationId xmlns:a16="http://schemas.microsoft.com/office/drawing/2014/main" id="{E28746DF-ACEC-49C1-AEFB-FCE32665425A}"/>
+              </a:ext>
+            </a:extLst>
+          </p:cNvPr>
+          <p:cNvSpPr txBox="1"/>
+          <p:nvPr/>
+        </p:nvSpPr>
+        <p:spPr>
+          <a:xfrm>
+            <a:off x="249409" y="5296753"/>
+            <a:ext cx="6608105" cy="1477328"/>
+          </a:xfrm>
+          <a:prstGeom prst="rect">
+            <a:avLst/>
+          </a:prstGeom>
+          <a:noFill/>
+        </p:spPr>
+        <p:txBody>
+          <a:bodyPr wrap="square" rtlCol="0">
+            <a:spAutoFit/>
+          </a:bodyPr>
+          <a:lstStyle/>
+          <a:p>
+            <a:r>
+              <a:rPr lang="en-US" dirty="0"/>
+              <a:t>Dm2 to axis of window :153.9mm</a:t>
+            </a:r>
+          </a:p>
+          <a:p>
+            <a:r>
+              <a:rPr lang="en-US" dirty="0"/>
+              <a:t>Angle :</a:t>
+            </a:r>
+          </a:p>
+          <a:p>
+            <a:r>
+              <a:rPr lang="en-US" dirty="0"/>
+              <a:t>Right max angle of the edge:12.739degree</a:t>
+            </a:r>
+          </a:p>
+          <a:p>
+            <a:r>
+              <a:rPr lang="en-US" dirty="0"/>
+              <a:t>L</a:t>
+            </a:r>
+            <a:r>
+              <a:rPr lang="en-US" altLang="zh-CN" dirty="0"/>
+              <a:t>ef</a:t>
+            </a:r>
+            <a:r>
+              <a:rPr lang="en-US" dirty="0"/>
+              <a:t>t max angle of the edge:19.764degree</a:t>
+            </a:r>
+          </a:p>
+          <a:p>
+            <a:r>
+              <a:rPr lang="en-US" dirty="0"/>
+              <a:t>L</a:t>
+            </a:r>
+            <a:r>
+              <a:rPr lang="en-US" baseline="-25000" dirty="0"/>
+              <a:t>OFF-AXIS</a:t>
+            </a:r>
+            <a:r>
+              <a:rPr lang="en-US" dirty="0"/>
+              <a:t>=131.3mm</a:t>
+            </a:r>
+          </a:p>
+        </p:txBody>
+      </p:sp>
     </p:spTree>
     <p:extLst>
       <p:ext uri="{BB962C8B-B14F-4D97-AF65-F5344CB8AC3E}">
@@ -20228,8 +21770,8 @@
           </a:p>
         </p:txBody>
       </p:sp>
-      <mc:AlternateContent xmlns:mc="http://schemas.openxmlformats.org/markup-compatibility/2006">
-        <mc:Choice xmlns:a14="http://schemas.microsoft.com/office/drawing/2010/main" Requires="a14">
+      <mc:AlternateContent xmlns:mc="http://schemas.openxmlformats.org/markup-compatibility/2006" xmlns:a14="http://schemas.microsoft.com/office/drawing/2010/main">
+        <mc:Choice Requires="a14">
           <p:sp>
             <p:nvSpPr>
               <p:cNvPr id="24" name="TextBox 23">
@@ -20325,6 +21867,7 @@
                 </a:r>
               </a:p>
               <a:p>
+                <a:pPr/>
                 <a14:m>
                   <m:oMathPara xmlns:m="http://schemas.openxmlformats.org/officeDocument/2006/math">
                     <m:oMathParaPr>
@@ -20498,7 +22041,7 @@
             </p:txBody>
           </p:sp>
         </mc:Choice>
-        <mc:Fallback>
+        <mc:Fallback xmlns="">
           <p:sp>
             <p:nvSpPr>
               <p:cNvPr id="24" name="TextBox 23">
@@ -21169,8 +22712,8 @@
             </a:p>
           </p:txBody>
         </p:sp>
-        <mc:AlternateContent xmlns:mc="http://schemas.openxmlformats.org/markup-compatibility/2006">
-          <mc:Choice xmlns:a14="http://schemas.microsoft.com/office/drawing/2010/main" Requires="a14">
+        <mc:AlternateContent xmlns:mc="http://schemas.openxmlformats.org/markup-compatibility/2006" xmlns:a14="http://schemas.microsoft.com/office/drawing/2010/main">
+          <mc:Choice Requires="a14">
             <p:sp>
               <p:nvSpPr>
                 <p:cNvPr id="69" name="TextBox 68">
@@ -21199,6 +22742,7 @@
                 </a:bodyPr>
                 <a:lstStyle/>
                 <a:p>
+                  <a:pPr/>
                   <a14:m>
                     <m:oMathPara xmlns:m="http://schemas.openxmlformats.org/officeDocument/2006/math">
                       <m:oMathParaPr>
@@ -21250,7 +22794,7 @@
               </p:txBody>
             </p:sp>
           </mc:Choice>
-          <mc:Fallback>
+          <mc:Fallback xmlns="">
             <p:sp>
               <p:nvSpPr>
                 <p:cNvPr id="69" name="TextBox 68">
@@ -22266,8 +23810,8 @@
             </p:nvSpPr>
             <p:spPr>
               <a:xfrm>
-                <a:off x="6217413" y="2812503"/>
-                <a:ext cx="5288382" cy="1754326"/>
+                <a:off x="6096000" y="1832788"/>
+                <a:ext cx="5288382" cy="3693319"/>
               </a:xfrm>
               <a:prstGeom prst="rect">
                 <a:avLst/>
@@ -22282,7 +23826,7 @@
               <a:p>
                 <a:r>
                   <a:rPr lang="en-US" dirty="0"/>
-                  <a:t>use  visible  laser from receiver antenna and steer M2 until the laser reach Launch Mirror point. record that angle of M2 as </a:t>
+                  <a:t>1.use  visible  laser from receiver antenna and steer M2 until the laser reach Launch Mirror point. record that angle of M2 as </a:t>
                 </a:r>
                 <a14:m>
                   <m:oMath xmlns:m="http://schemas.openxmlformats.org/officeDocument/2006/math">
@@ -22384,6 +23928,128 @@
                   <a:t> to avoid the possible exposing.</a:t>
                 </a:r>
               </a:p>
+              <a:p>
+                <a:r>
+                  <a:rPr lang="en-US" dirty="0"/>
+                  <a:t>2. use  visible  laser from launch antenna and steer LM until the laser reach M2 </a:t>
+                </a:r>
+                <a:r>
+                  <a:rPr lang="en-US" altLang="zh-CN" dirty="0"/>
+                  <a:t>center </a:t>
+                </a:r>
+                <a:r>
+                  <a:rPr lang="en-US" dirty="0"/>
+                  <a:t>point. record that angle of LM as </a:t>
+                </a:r>
+                <a14:m>
+                  <m:oMath xmlns:m="http://schemas.openxmlformats.org/officeDocument/2006/math">
+                    <m:sSub>
+                      <m:sSubPr>
+                        <m:ctrlPr>
+                          <a:rPr lang="en-US" i="1">
+                            <a:latin typeface="Cambria Math" panose="02040503050406030204" pitchFamily="18" charset="0"/>
+                          </a:rPr>
+                        </m:ctrlPr>
+                      </m:sSubPr>
+                      <m:e>
+                        <m:r>
+                          <a:rPr lang="en-US" i="1">
+                            <a:latin typeface="Cambria Math" panose="02040503050406030204" pitchFamily="18" charset="0"/>
+                          </a:rPr>
+                          <m:t>𝜙</m:t>
+                        </m:r>
+                      </m:e>
+                      <m:sub>
+                        <m:r>
+                          <a:rPr lang="en-US" b="0" i="1" smtClean="0">
+                            <a:latin typeface="Cambria Math" panose="02040503050406030204" pitchFamily="18" charset="0"/>
+                          </a:rPr>
+                          <m:t>𝐵</m:t>
+                        </m:r>
+                      </m:sub>
+                    </m:sSub>
+                  </m:oMath>
+                </a14:m>
+                <a:r>
+                  <a:rPr lang="en-US" dirty="0"/>
+                  <a:t>. The LM (Launch Mirror)at the angle </a:t>
+                </a:r>
+                <a14:m>
+                  <m:oMath xmlns:m="http://schemas.openxmlformats.org/officeDocument/2006/math">
+                    <m:sSub>
+                      <m:sSubPr>
+                        <m:ctrlPr>
+                          <a:rPr lang="en-US" i="1">
+                            <a:latin typeface="Cambria Math" panose="02040503050406030204" pitchFamily="18" charset="0"/>
+                          </a:rPr>
+                        </m:ctrlPr>
+                      </m:sSubPr>
+                      <m:e>
+                        <m:r>
+                          <a:rPr lang="en-US" i="1">
+                            <a:latin typeface="Cambria Math" panose="02040503050406030204" pitchFamily="18" charset="0"/>
+                          </a:rPr>
+                          <m:t>𝜙</m:t>
+                        </m:r>
+                      </m:e>
+                      <m:sub>
+                        <m:r>
+                          <a:rPr lang="en-US" b="0" i="1" smtClean="0">
+                            <a:latin typeface="Cambria Math" panose="02040503050406030204" pitchFamily="18" charset="0"/>
+                          </a:rPr>
+                          <m:t>𝐵</m:t>
+                        </m:r>
+                      </m:sub>
+                    </m:sSub>
+                  </m:oMath>
+                </a14:m>
+                <a:r>
+                  <a:rPr lang="en-US" dirty="0"/>
+                  <a:t>  possible  illuminate the receiver antenna. Set the LM angle no equal </a:t>
+                </a:r>
+                <a14:m>
+                  <m:oMath xmlns:m="http://schemas.openxmlformats.org/officeDocument/2006/math">
+                    <m:sSub>
+                      <m:sSubPr>
+                        <m:ctrlPr>
+                          <a:rPr lang="en-US" i="1">
+                            <a:latin typeface="Cambria Math" panose="02040503050406030204" pitchFamily="18" charset="0"/>
+                          </a:rPr>
+                        </m:ctrlPr>
+                      </m:sSubPr>
+                      <m:e>
+                        <m:r>
+                          <a:rPr lang="en-US" i="1">
+                            <a:latin typeface="Cambria Math" panose="02040503050406030204" pitchFamily="18" charset="0"/>
+                          </a:rPr>
+                          <m:t>𝜙</m:t>
+                        </m:r>
+                      </m:e>
+                      <m:sub>
+                        <m:r>
+                          <a:rPr lang="en-US" b="0" i="1" smtClean="0">
+                            <a:latin typeface="Cambria Math" panose="02040503050406030204" pitchFamily="18" charset="0"/>
+                          </a:rPr>
+                          <m:t>𝐵</m:t>
+                        </m:r>
+                      </m:sub>
+                    </m:sSub>
+                  </m:oMath>
+                </a14:m>
+                <a:r>
+                  <a:rPr lang="en-US" dirty="0"/>
+                  <a:t> to avoid the possible exposing.</a:t>
+                </a:r>
+              </a:p>
+              <a:p>
+                <a:endParaRPr lang="en-US" dirty="0"/>
+              </a:p>
+              <a:p>
+                <a:endParaRPr lang="en-US" dirty="0"/>
+              </a:p>
+              <a:p>
+                <a:endParaRPr lang="en-US" dirty="0"/>
+              </a:p>
             </p:txBody>
           </p:sp>
         </mc:Choice>
@@ -22404,8 +24070,8 @@
             </p:nvSpPr>
             <p:spPr>
               <a:xfrm>
-                <a:off x="6217413" y="2812503"/>
-                <a:ext cx="5288382" cy="1754326"/>
+                <a:off x="6096000" y="1832788"/>
+                <a:ext cx="5288382" cy="3693319"/>
               </a:xfrm>
               <a:prstGeom prst="rect">
                 <a:avLst/>
@@ -22413,7 +24079,7 @@
               <a:blipFill>
                 <a:blip r:embed="rId3"/>
                 <a:stretch>
-                  <a:fillRect l="-1038" t="-1389" r="-231" b="-4861"/>
+                  <a:fillRect l="-922" t="-990" r="-1613"/>
                 </a:stretch>
               </a:blipFill>
             </p:spPr>
@@ -22447,7 +24113,7 @@
         <p:spPr>
           <a:xfrm>
             <a:off x="4769463" y="509895"/>
-            <a:ext cx="2285241" cy="646331"/>
+            <a:ext cx="2141355" cy="646331"/>
           </a:xfrm>
           <a:prstGeom prst="rect">
             <a:avLst/>
@@ -22468,7 +24134,7 @@
           <a:p>
             <a:r>
               <a:rPr lang="en-US" b="1" dirty="0"/>
-              <a:t>(Absolute Point)</a:t>
+              <a:t>(LM)</a:t>
             </a:r>
           </a:p>
         </p:txBody>
@@ -22732,8 +24398,8 @@
           </a:p>
         </p:txBody>
       </p:sp>
-      <mc:AlternateContent xmlns:mc="http://schemas.openxmlformats.org/markup-compatibility/2006">
-        <mc:Choice xmlns:a14="http://schemas.microsoft.com/office/drawing/2010/main" Requires="a14">
+      <mc:AlternateContent xmlns:mc="http://schemas.openxmlformats.org/markup-compatibility/2006" xmlns:a14="http://schemas.microsoft.com/office/drawing/2010/main">
+        <mc:Choice Requires="a14">
           <p:sp>
             <p:nvSpPr>
               <p:cNvPr id="71" name="TextBox 70">
@@ -23225,7 +24891,7 @@
             </p:txBody>
           </p:sp>
         </mc:Choice>
-        <mc:Fallback>
+        <mc:Fallback xmlns="">
           <p:sp>
             <p:nvSpPr>
               <p:cNvPr id="71" name="TextBox 70">
@@ -24354,7 +26020,7 @@
         </p:nvSpPr>
         <p:spPr>
           <a:xfrm>
-            <a:off x="8394124" y="2314567"/>
+            <a:off x="8845941" y="2232190"/>
             <a:ext cx="657681" cy="461665"/>
           </a:xfrm>
           <a:prstGeom prst="rect">
@@ -24528,8 +26194,8 @@
           </a:p>
         </p:txBody>
       </p:sp>
-      <mc:AlternateContent xmlns:mc="http://schemas.openxmlformats.org/markup-compatibility/2006">
-        <mc:Choice xmlns:a14="http://schemas.microsoft.com/office/drawing/2010/main" Requires="a14">
+      <mc:AlternateContent xmlns:mc="http://schemas.openxmlformats.org/markup-compatibility/2006" xmlns:a14="http://schemas.microsoft.com/office/drawing/2010/main">
+        <mc:Choice Requires="a14">
           <p:sp>
             <p:nvSpPr>
               <p:cNvPr id="37" name="TextBox 36">
@@ -24728,7 +26394,7 @@
             </p:txBody>
           </p:sp>
         </mc:Choice>
-        <mc:Fallback>
+        <mc:Fallback xmlns="">
           <p:sp>
             <p:nvSpPr>
               <p:cNvPr id="37" name="TextBox 36">
@@ -25073,7 +26739,7 @@
                   </a:schemeClr>
                 </a:solidFill>
               </a:rPr>
-              <a:t> = major radius of vacuum window (fixed)</a:t>
+              <a:t> = major radius of vacuum window (fixed)1873.5mm</a:t>
             </a:r>
           </a:p>
           <a:p>
@@ -25413,6 +27079,133 @@
           <p:cNvPr id="2" name="Slide Number Placeholder 1">
             <a:extLst>
               <a:ext uri="{FF2B5EF4-FFF2-40B4-BE49-F238E27FC236}">
+                <a16:creationId xmlns:a16="http://schemas.microsoft.com/office/drawing/2014/main" id="{6DF594DC-A1F7-4529-BC57-01C1A2208298}"/>
+              </a:ext>
+            </a:extLst>
+          </p:cNvPr>
+          <p:cNvSpPr>
+            <a:spLocks noGrp="1"/>
+          </p:cNvSpPr>
+          <p:nvPr>
+            <p:ph type="sldNum" sz="quarter" idx="12"/>
+          </p:nvPr>
+        </p:nvSpPr>
+        <p:spPr/>
+        <p:txBody>
+          <a:bodyPr/>
+          <a:lstStyle/>
+          <a:p>
+            <a:fld id="{C8EB1B78-1A80-4349-98CC-41A40981A64A}" type="slidenum">
+              <a:rPr lang="en-US" smtClean="0"/>
+              <a:t>8</a:t>
+            </a:fld>
+            <a:endParaRPr lang="en-US"/>
+          </a:p>
+        </p:txBody>
+      </p:sp>
+      <p:sp>
+        <p:nvSpPr>
+          <p:cNvPr id="3" name="TextBox 2">
+            <a:extLst>
+              <a:ext uri="{FF2B5EF4-FFF2-40B4-BE49-F238E27FC236}">
+                <a16:creationId xmlns:a16="http://schemas.microsoft.com/office/drawing/2014/main" id="{569C37E7-9454-4607-886E-CA44E15FCABA}"/>
+              </a:ext>
+            </a:extLst>
+          </p:cNvPr>
+          <p:cNvSpPr txBox="1"/>
+          <p:nvPr/>
+        </p:nvSpPr>
+        <p:spPr>
+          <a:xfrm>
+            <a:off x="158620" y="261257"/>
+            <a:ext cx="8126964" cy="1754326"/>
+          </a:xfrm>
+          <a:prstGeom prst="rect">
+            <a:avLst/>
+          </a:prstGeom>
+          <a:noFill/>
+        </p:spPr>
+        <p:txBody>
+          <a:bodyPr wrap="square" rtlCol="0">
+            <a:spAutoFit/>
+          </a:bodyPr>
+          <a:lstStyle/>
+          <a:p>
+            <a:r>
+              <a:rPr lang="en-US" dirty="0"/>
+              <a:t>alignment procedure:</a:t>
+            </a:r>
+          </a:p>
+          <a:p>
+            <a:pPr marL="342900" indent="-342900">
+              <a:buAutoNum type="arabicPeriod"/>
+            </a:pPr>
+            <a:r>
+              <a:rPr lang="en-US" dirty="0"/>
+              <a:t>Take down the  cylindrical lens and meniscus lens </a:t>
+            </a:r>
+          </a:p>
+          <a:p>
+            <a:pPr marL="342900" indent="-342900">
+              <a:buAutoNum type="arabicPeriod"/>
+            </a:pPr>
+            <a:r>
+              <a:rPr lang="en-US" dirty="0"/>
+              <a:t>mount the visible laser  on the central of the antenna and adjust the visible laser angle to reach to the center of the  convex lens.</a:t>
+            </a:r>
+          </a:p>
+          <a:p>
+            <a:pPr marL="342900" indent="-342900">
+              <a:buAutoNum type="arabicPeriod"/>
+            </a:pPr>
+            <a:r>
+              <a:rPr lang="en-US" dirty="0"/>
+              <a:t>Take down the convex lens and </a:t>
+            </a:r>
+          </a:p>
+          <a:p>
+            <a:pPr marL="342900" indent="-342900">
+              <a:buAutoNum type="arabicPeriod"/>
+            </a:pPr>
+            <a:endParaRPr lang="en-US" dirty="0"/>
+          </a:p>
+        </p:txBody>
+      </p:sp>
+    </p:spTree>
+    <p:extLst>
+      <p:ext uri="{BB962C8B-B14F-4D97-AF65-F5344CB8AC3E}">
+        <p14:creationId xmlns:p14="http://schemas.microsoft.com/office/powerpoint/2010/main" val="3720558612"/>
+      </p:ext>
+    </p:extLst>
+  </p:cSld>
+  <p:clrMapOvr>
+    <a:masterClrMapping/>
+  </p:clrMapOvr>
+</p:sld>
+</file>
+
+<file path=ppt/slides/slide9.xml><?xml version="1.0" encoding="utf-8"?>
+<p:sld xmlns:a="http://schemas.openxmlformats.org/drawingml/2006/main" xmlns:r="http://schemas.openxmlformats.org/officeDocument/2006/relationships" xmlns:p="http://schemas.openxmlformats.org/presentationml/2006/main">
+  <p:cSld>
+    <p:spTree>
+      <p:nvGrpSpPr>
+        <p:cNvPr id="1" name=""/>
+        <p:cNvGrpSpPr/>
+        <p:nvPr/>
+      </p:nvGrpSpPr>
+      <p:grpSpPr>
+        <a:xfrm>
+          <a:off x="0" y="0"/>
+          <a:ext cx="0" cy="0"/>
+          <a:chOff x="0" y="0"/>
+          <a:chExt cx="0" cy="0"/>
+        </a:xfrm>
+      </p:grpSpPr>
+      <p:sp>
+        <p:nvSpPr>
+          <p:cNvPr id="2" name="Slide Number Placeholder 1">
+            <a:extLst>
+              <a:ext uri="{FF2B5EF4-FFF2-40B4-BE49-F238E27FC236}">
                 <a16:creationId xmlns:a16="http://schemas.microsoft.com/office/drawing/2014/main" id="{CCE85FD4-652D-9D87-CFB2-5403ADBBAA24}"/>
               </a:ext>
             </a:extLst>
@@ -25431,7 +27224,7 @@
           <a:p>
             <a:fld id="{C8EB1B78-1A80-4349-98CC-41A40981A64A}" type="slidenum">
               <a:rPr lang="en-US" smtClean="0"/>
-              <a:t>8</a:t>
+              <a:t>9</a:t>
             </a:fld>
             <a:endParaRPr lang="en-US"/>
           </a:p>
@@ -25504,1470 +27297,6 @@
     <p:extLst>
       <p:ext uri="{BB962C8B-B14F-4D97-AF65-F5344CB8AC3E}">
         <p14:creationId xmlns:p14="http://schemas.microsoft.com/office/powerpoint/2010/main" val="2857820326"/>
-      </p:ext>
-    </p:extLst>
-  </p:cSld>
-  <p:clrMapOvr>
-    <a:masterClrMapping/>
-  </p:clrMapOvr>
-</p:sld>
-</file>
-
-<file path=ppt/slides/slide9.xml><?xml version="1.0" encoding="utf-8"?>
-<p:sld xmlns:a="http://schemas.openxmlformats.org/drawingml/2006/main" xmlns:r="http://schemas.openxmlformats.org/officeDocument/2006/relationships" xmlns:p="http://schemas.openxmlformats.org/presentationml/2006/main">
-  <p:cSld>
-    <p:spTree>
-      <p:nvGrpSpPr>
-        <p:cNvPr id="1" name=""/>
-        <p:cNvGrpSpPr/>
-        <p:nvPr/>
-      </p:nvGrpSpPr>
-      <p:grpSpPr>
-        <a:xfrm>
-          <a:off x="0" y="0"/>
-          <a:ext cx="0" cy="0"/>
-          <a:chOff x="0" y="0"/>
-          <a:chExt cx="0" cy="0"/>
-        </a:xfrm>
-      </p:grpSpPr>
-      <p:pic>
-        <p:nvPicPr>
-          <p:cNvPr id="6" name="Picture 5"/>
-          <p:cNvPicPr>
-            <a:picLocks noChangeAspect="1"/>
-          </p:cNvPicPr>
-          <p:nvPr/>
-        </p:nvPicPr>
-        <p:blipFill rotWithShape="1">
-          <a:blip r:embed="rId2"/>
-          <a:srcRect l="43390" t="20221" r="9273" b="57059"/>
-          <a:stretch/>
-        </p:blipFill>
-        <p:spPr>
-          <a:xfrm>
-            <a:off x="4447732" y="5752273"/>
-            <a:ext cx="3583745" cy="967612"/>
-          </a:xfrm>
-          <a:prstGeom prst="rect">
-            <a:avLst/>
-          </a:prstGeom>
-        </p:spPr>
-      </p:pic>
-      <p:sp>
-        <p:nvSpPr>
-          <p:cNvPr id="11" name="TextBox 10"/>
-          <p:cNvSpPr txBox="1"/>
-          <p:nvPr/>
-        </p:nvSpPr>
-        <p:spPr>
-          <a:xfrm>
-            <a:off x="5508521" y="322913"/>
-            <a:ext cx="2791405" cy="461665"/>
-          </a:xfrm>
-          <a:prstGeom prst="rect">
-            <a:avLst/>
-          </a:prstGeom>
-          <a:noFill/>
-        </p:spPr>
-        <p:txBody>
-          <a:bodyPr wrap="none" rtlCol="0">
-            <a:spAutoFit/>
-          </a:bodyPr>
-          <a:lstStyle/>
-          <a:p>
-            <a:r>
-              <a:rPr lang="en-US" sz="2400" b="1" dirty="0"/>
-              <a:t>Bay G Launch Mirror</a:t>
-            </a:r>
-          </a:p>
-        </p:txBody>
-      </p:sp>
-      <p:sp>
-        <p:nvSpPr>
-          <p:cNvPr id="12" name="TextBox 11"/>
-          <p:cNvSpPr txBox="1"/>
-          <p:nvPr/>
-        </p:nvSpPr>
-        <p:spPr>
-          <a:xfrm>
-            <a:off x="4544834" y="2683814"/>
-            <a:ext cx="1791260" cy="461665"/>
-          </a:xfrm>
-          <a:prstGeom prst="rect">
-            <a:avLst/>
-          </a:prstGeom>
-          <a:noFill/>
-        </p:spPr>
-        <p:txBody>
-          <a:bodyPr wrap="none" rtlCol="0">
-            <a:spAutoFit/>
-          </a:bodyPr>
-          <a:lstStyle/>
-          <a:p>
-            <a:r>
-              <a:rPr lang="en-US" sz="2400" b="1"/>
-              <a:t>Torus Center</a:t>
-            </a:r>
-          </a:p>
-        </p:txBody>
-      </p:sp>
-      <p:sp>
-        <p:nvSpPr>
-          <p:cNvPr id="19" name="TextBox 18"/>
-          <p:cNvSpPr txBox="1"/>
-          <p:nvPr/>
-        </p:nvSpPr>
-        <p:spPr>
-          <a:xfrm>
-            <a:off x="6890438" y="6327042"/>
-            <a:ext cx="1262910" cy="461665"/>
-          </a:xfrm>
-          <a:prstGeom prst="rect">
-            <a:avLst/>
-          </a:prstGeom>
-          <a:noFill/>
-        </p:spPr>
-        <p:txBody>
-          <a:bodyPr wrap="none" rtlCol="0">
-            <a:spAutoFit/>
-          </a:bodyPr>
-          <a:lstStyle/>
-          <a:p>
-            <a:r>
-              <a:rPr lang="en-US" sz="2400" b="1"/>
-              <a:t>Window</a:t>
-            </a:r>
-          </a:p>
-        </p:txBody>
-      </p:sp>
-      <p:sp>
-        <p:nvSpPr>
-          <p:cNvPr id="20" name="Rectangle 19"/>
-          <p:cNvSpPr/>
-          <p:nvPr/>
-        </p:nvSpPr>
-        <p:spPr>
-          <a:xfrm>
-            <a:off x="6024363" y="6477454"/>
-            <a:ext cx="796923" cy="94069"/>
-          </a:xfrm>
-          <a:prstGeom prst="rect">
-            <a:avLst/>
-          </a:prstGeom>
-        </p:spPr>
-        <p:style>
-          <a:lnRef idx="2">
-            <a:schemeClr val="accent1">
-              <a:shade val="50000"/>
-            </a:schemeClr>
-          </a:lnRef>
-          <a:fillRef idx="1">
-            <a:schemeClr val="accent1"/>
-          </a:fillRef>
-          <a:effectRef idx="0">
-            <a:schemeClr val="accent1"/>
-          </a:effectRef>
-          <a:fontRef idx="minor">
-            <a:schemeClr val="lt1"/>
-          </a:fontRef>
-        </p:style>
-        <p:txBody>
-          <a:bodyPr rtlCol="0" anchor="ctr"/>
-          <a:lstStyle/>
-          <a:p>
-            <a:pPr algn="ctr"/>
-            <a:endParaRPr lang="en-US"/>
-          </a:p>
-        </p:txBody>
-      </p:sp>
-      <p:sp>
-        <p:nvSpPr>
-          <p:cNvPr id="41" name="TextBox 40"/>
-          <p:cNvSpPr txBox="1"/>
-          <p:nvPr/>
-        </p:nvSpPr>
-        <p:spPr>
-          <a:xfrm>
-            <a:off x="212434" y="68234"/>
-            <a:ext cx="5514326" cy="890115"/>
-          </a:xfrm>
-          <a:prstGeom prst="rect">
-            <a:avLst/>
-          </a:prstGeom>
-          <a:noFill/>
-        </p:spPr>
-        <p:txBody>
-          <a:bodyPr wrap="square" rtlCol="0">
-            <a:spAutoFit/>
-          </a:bodyPr>
-          <a:lstStyle/>
-          <a:p>
-            <a:pPr>
-              <a:lnSpc>
-                <a:spcPct val="80000"/>
-              </a:lnSpc>
-            </a:pPr>
-            <a:r>
-              <a:rPr lang="en-US" sz="3200" b="1" dirty="0">
-                <a:solidFill>
-                  <a:srgbClr val="FF0000"/>
-                </a:solidFill>
-              </a:rPr>
-              <a:t>NSTX-U High-k Scattering Launch Geometry</a:t>
-            </a:r>
-          </a:p>
-        </p:txBody>
-      </p:sp>
-      <p:cxnSp>
-        <p:nvCxnSpPr>
-          <p:cNvPr id="42" name="Straight Connector 41"/>
-          <p:cNvCxnSpPr/>
-          <p:nvPr/>
-        </p:nvCxnSpPr>
-        <p:spPr>
-          <a:xfrm flipH="1" flipV="1">
-            <a:off x="6125356" y="3194531"/>
-            <a:ext cx="0" cy="3383280"/>
-          </a:xfrm>
-          <a:prstGeom prst="line">
-            <a:avLst/>
-          </a:prstGeom>
-          <a:ln w="25400">
-            <a:solidFill>
-              <a:srgbClr val="FF0000"/>
-            </a:solidFill>
-          </a:ln>
-        </p:spPr>
-        <p:style>
-          <a:lnRef idx="1">
-            <a:schemeClr val="accent1"/>
-          </a:lnRef>
-          <a:fillRef idx="0">
-            <a:schemeClr val="accent1"/>
-          </a:fillRef>
-          <a:effectRef idx="0">
-            <a:schemeClr val="accent1"/>
-          </a:effectRef>
-          <a:fontRef idx="minor">
-            <a:schemeClr val="tx1"/>
-          </a:fontRef>
-        </p:style>
-      </p:cxnSp>
-      <p:cxnSp>
-        <p:nvCxnSpPr>
-          <p:cNvPr id="45" name="Straight Connector 44"/>
-          <p:cNvCxnSpPr/>
-          <p:nvPr/>
-        </p:nvCxnSpPr>
-        <p:spPr>
-          <a:xfrm rot="780000" flipV="1">
-            <a:off x="6615591" y="4766159"/>
-            <a:ext cx="0" cy="1828800"/>
-          </a:xfrm>
-          <a:prstGeom prst="line">
-            <a:avLst/>
-          </a:prstGeom>
-          <a:ln w="25400">
-            <a:solidFill>
-              <a:srgbClr val="FF0000"/>
-            </a:solidFill>
-          </a:ln>
-        </p:spPr>
-        <p:style>
-          <a:lnRef idx="1">
-            <a:schemeClr val="accent1"/>
-          </a:lnRef>
-          <a:fillRef idx="0">
-            <a:schemeClr val="accent1"/>
-          </a:fillRef>
-          <a:effectRef idx="0">
-            <a:schemeClr val="accent1"/>
-          </a:effectRef>
-          <a:fontRef idx="minor">
-            <a:schemeClr val="tx1"/>
-          </a:fontRef>
-        </p:style>
-      </p:cxnSp>
-      <p:sp>
-        <p:nvSpPr>
-          <p:cNvPr id="46" name="TextBox 45"/>
-          <p:cNvSpPr txBox="1"/>
-          <p:nvPr/>
-        </p:nvSpPr>
-        <p:spPr>
-          <a:xfrm>
-            <a:off x="6904223" y="4440772"/>
-            <a:ext cx="1807299" cy="690638"/>
-          </a:xfrm>
-          <a:prstGeom prst="rect">
-            <a:avLst/>
-          </a:prstGeom>
-          <a:noFill/>
-        </p:spPr>
-        <p:txBody>
-          <a:bodyPr wrap="square" rtlCol="0">
-            <a:spAutoFit/>
-          </a:bodyPr>
-          <a:lstStyle/>
-          <a:p>
-            <a:pPr>
-              <a:lnSpc>
-                <a:spcPct val="80000"/>
-              </a:lnSpc>
-            </a:pPr>
-            <a:r>
-              <a:rPr lang="en-US" sz="2400" b="1" dirty="0">
-                <a:solidFill>
-                  <a:srgbClr val="0070C0"/>
-                </a:solidFill>
-              </a:rPr>
-              <a:t>Interaction Region (IR)</a:t>
-            </a:r>
-          </a:p>
-        </p:txBody>
-      </p:sp>
-      <p:cxnSp>
-        <p:nvCxnSpPr>
-          <p:cNvPr id="47" name="Straight Connector 46"/>
-          <p:cNvCxnSpPr>
-            <a:stCxn id="44" idx="4"/>
-          </p:cNvCxnSpPr>
-          <p:nvPr/>
-        </p:nvCxnSpPr>
-        <p:spPr>
-          <a:xfrm flipH="1" flipV="1">
-            <a:off x="6162924" y="3218733"/>
-            <a:ext cx="640080" cy="1554480"/>
-          </a:xfrm>
-          <a:prstGeom prst="line">
-            <a:avLst/>
-          </a:prstGeom>
-          <a:ln w="25400">
-            <a:solidFill>
-              <a:srgbClr val="0070C0"/>
-            </a:solidFill>
-            <a:headEnd type="triangle" w="lg" len="lg"/>
-            <a:tailEnd type="none"/>
-          </a:ln>
-        </p:spPr>
-        <p:style>
-          <a:lnRef idx="1">
-            <a:schemeClr val="accent1"/>
-          </a:lnRef>
-          <a:fillRef idx="0">
-            <a:schemeClr val="accent1"/>
-          </a:fillRef>
-          <a:effectRef idx="0">
-            <a:schemeClr val="accent1"/>
-          </a:effectRef>
-          <a:fontRef idx="minor">
-            <a:schemeClr val="tx1"/>
-          </a:fontRef>
-        </p:style>
-      </p:cxnSp>
-      <p:cxnSp>
-        <p:nvCxnSpPr>
-          <p:cNvPr id="48" name="Straight Connector 47"/>
-          <p:cNvCxnSpPr/>
-          <p:nvPr/>
-        </p:nvCxnSpPr>
-        <p:spPr>
-          <a:xfrm rot="1200000" flipH="1" flipV="1">
-            <a:off x="7618074" y="450448"/>
-            <a:ext cx="0" cy="4480560"/>
-          </a:xfrm>
-          <a:prstGeom prst="line">
-            <a:avLst/>
-          </a:prstGeom>
-          <a:ln w="25400">
-            <a:solidFill>
-              <a:srgbClr val="FF0000"/>
-            </a:solidFill>
-          </a:ln>
-        </p:spPr>
-        <p:style>
-          <a:lnRef idx="1">
-            <a:schemeClr val="accent1"/>
-          </a:lnRef>
-          <a:fillRef idx="0">
-            <a:schemeClr val="accent1"/>
-          </a:fillRef>
-          <a:effectRef idx="0">
-            <a:schemeClr val="accent1"/>
-          </a:effectRef>
-          <a:fontRef idx="minor">
-            <a:schemeClr val="tx1"/>
-          </a:fontRef>
-        </p:style>
-      </p:cxnSp>
-      <p:sp>
-        <p:nvSpPr>
-          <p:cNvPr id="14" name="Oval 13"/>
-          <p:cNvSpPr/>
-          <p:nvPr/>
-        </p:nvSpPr>
-        <p:spPr>
-          <a:xfrm>
-            <a:off x="8294694" y="501857"/>
-            <a:ext cx="182880" cy="182880"/>
-          </a:xfrm>
-          <a:prstGeom prst="ellipse">
-            <a:avLst/>
-          </a:prstGeom>
-          <a:solidFill>
-            <a:schemeClr val="tx1"/>
-          </a:solidFill>
-        </p:spPr>
-        <p:style>
-          <a:lnRef idx="2">
-            <a:schemeClr val="accent1">
-              <a:shade val="50000"/>
-            </a:schemeClr>
-          </a:lnRef>
-          <a:fillRef idx="1">
-            <a:schemeClr val="accent1"/>
-          </a:fillRef>
-          <a:effectRef idx="0">
-            <a:schemeClr val="accent1"/>
-          </a:effectRef>
-          <a:fontRef idx="minor">
-            <a:schemeClr val="lt1"/>
-          </a:fontRef>
-        </p:style>
-        <p:txBody>
-          <a:bodyPr rtlCol="0" anchor="ctr"/>
-          <a:lstStyle/>
-          <a:p>
-            <a:pPr algn="ctr"/>
-            <a:endParaRPr lang="en-US"/>
-          </a:p>
-        </p:txBody>
-      </p:sp>
-      <p:cxnSp>
-        <p:nvCxnSpPr>
-          <p:cNvPr id="43" name="Straight Connector 42"/>
-          <p:cNvCxnSpPr/>
-          <p:nvPr/>
-        </p:nvCxnSpPr>
-        <p:spPr>
-          <a:xfrm rot="2460000" flipH="1" flipV="1">
-            <a:off x="7265167" y="170170"/>
-            <a:ext cx="0" cy="3474720"/>
-          </a:xfrm>
-          <a:prstGeom prst="line">
-            <a:avLst/>
-          </a:prstGeom>
-          <a:ln w="25400">
-            <a:solidFill>
-              <a:srgbClr val="FF0000"/>
-            </a:solidFill>
-          </a:ln>
-        </p:spPr>
-        <p:style>
-          <a:lnRef idx="1">
-            <a:schemeClr val="accent1"/>
-          </a:lnRef>
-          <a:fillRef idx="0">
-            <a:schemeClr val="accent1"/>
-          </a:fillRef>
-          <a:effectRef idx="0">
-            <a:schemeClr val="accent1"/>
-          </a:effectRef>
-          <a:fontRef idx="minor">
-            <a:schemeClr val="tx1"/>
-          </a:fontRef>
-        </p:style>
-      </p:cxnSp>
-      <p:sp>
-        <p:nvSpPr>
-          <p:cNvPr id="18" name="Oval 17"/>
-          <p:cNvSpPr/>
-          <p:nvPr/>
-        </p:nvSpPr>
-        <p:spPr>
-          <a:xfrm>
-            <a:off x="6024364" y="3095580"/>
-            <a:ext cx="182880" cy="182880"/>
-          </a:xfrm>
-          <a:prstGeom prst="ellipse">
-            <a:avLst/>
-          </a:prstGeom>
-          <a:solidFill>
-            <a:schemeClr val="tx1"/>
-          </a:solidFill>
-        </p:spPr>
-        <p:style>
-          <a:lnRef idx="2">
-            <a:schemeClr val="accent1">
-              <a:shade val="50000"/>
-            </a:schemeClr>
-          </a:lnRef>
-          <a:fillRef idx="1">
-            <a:schemeClr val="accent1"/>
-          </a:fillRef>
-          <a:effectRef idx="0">
-            <a:schemeClr val="accent1"/>
-          </a:effectRef>
-          <a:fontRef idx="minor">
-            <a:schemeClr val="lt1"/>
-          </a:fontRef>
-        </p:style>
-        <p:txBody>
-          <a:bodyPr rtlCol="0" anchor="ctr"/>
-          <a:lstStyle/>
-          <a:p>
-            <a:pPr algn="ctr"/>
-            <a:endParaRPr lang="en-US"/>
-          </a:p>
-        </p:txBody>
-      </p:sp>
-      <p:sp>
-        <p:nvSpPr>
-          <p:cNvPr id="44" name="Oval 43"/>
-          <p:cNvSpPr/>
-          <p:nvPr/>
-        </p:nvSpPr>
-        <p:spPr>
-          <a:xfrm>
-            <a:off x="6736322" y="4694651"/>
-            <a:ext cx="182880" cy="182880"/>
-          </a:xfrm>
-          <a:prstGeom prst="ellipse">
-            <a:avLst/>
-          </a:prstGeom>
-          <a:solidFill>
-            <a:schemeClr val="tx1"/>
-          </a:solidFill>
-        </p:spPr>
-        <p:style>
-          <a:lnRef idx="2">
-            <a:schemeClr val="accent1">
-              <a:shade val="50000"/>
-            </a:schemeClr>
-          </a:lnRef>
-          <a:fillRef idx="1">
-            <a:schemeClr val="accent1"/>
-          </a:fillRef>
-          <a:effectRef idx="0">
-            <a:schemeClr val="accent1"/>
-          </a:effectRef>
-          <a:fontRef idx="minor">
-            <a:schemeClr val="lt1"/>
-          </a:fontRef>
-        </p:style>
-        <p:txBody>
-          <a:bodyPr rtlCol="0" anchor="ctr"/>
-          <a:lstStyle/>
-          <a:p>
-            <a:pPr algn="ctr"/>
-            <a:endParaRPr lang="en-US"/>
-          </a:p>
-        </p:txBody>
-      </p:sp>
-      <p:sp>
-        <p:nvSpPr>
-          <p:cNvPr id="49" name="TextBox 48"/>
-          <p:cNvSpPr txBox="1"/>
-          <p:nvPr/>
-        </p:nvSpPr>
-        <p:spPr>
-          <a:xfrm>
-            <a:off x="6553576" y="3630593"/>
-            <a:ext cx="498855" cy="461665"/>
-          </a:xfrm>
-          <a:prstGeom prst="rect">
-            <a:avLst/>
-          </a:prstGeom>
-          <a:noFill/>
-        </p:spPr>
-        <p:txBody>
-          <a:bodyPr wrap="none" rtlCol="0">
-            <a:spAutoFit/>
-          </a:bodyPr>
-          <a:lstStyle/>
-          <a:p>
-            <a:r>
-              <a:rPr lang="el-GR" sz="2400" b="1">
-                <a:solidFill>
-                  <a:srgbClr val="FF0000"/>
-                </a:solidFill>
-              </a:rPr>
-              <a:t>ψ</a:t>
-            </a:r>
-            <a:r>
-              <a:rPr lang="en-US" sz="2400" b="1" baseline="-25000">
-                <a:solidFill>
-                  <a:srgbClr val="FF0000"/>
-                </a:solidFill>
-              </a:rPr>
-              <a:t>L</a:t>
-            </a:r>
-          </a:p>
-        </p:txBody>
-      </p:sp>
-      <p:sp>
-        <p:nvSpPr>
-          <p:cNvPr id="50" name="Arc 49"/>
-          <p:cNvSpPr/>
-          <p:nvPr/>
-        </p:nvSpPr>
-        <p:spPr>
-          <a:xfrm>
-            <a:off x="6179252" y="4077426"/>
-            <a:ext cx="1345201" cy="1420968"/>
-          </a:xfrm>
-          <a:prstGeom prst="arc">
-            <a:avLst>
-              <a:gd name="adj1" fmla="val 14767857"/>
-              <a:gd name="adj2" fmla="val 17347294"/>
-            </a:avLst>
-          </a:prstGeom>
-          <a:ln w="25400">
-            <a:solidFill>
-              <a:srgbClr val="FF0000"/>
-            </a:solidFill>
-            <a:tailEnd type="triangle" w="lg" len="lg"/>
-          </a:ln>
-        </p:spPr>
-        <p:style>
-          <a:lnRef idx="1">
-            <a:schemeClr val="accent1"/>
-          </a:lnRef>
-          <a:fillRef idx="0">
-            <a:schemeClr val="accent1"/>
-          </a:fillRef>
-          <a:effectRef idx="0">
-            <a:schemeClr val="accent1"/>
-          </a:effectRef>
-          <a:fontRef idx="minor">
-            <a:schemeClr val="tx1"/>
-          </a:fontRef>
-        </p:style>
-        <p:txBody>
-          <a:bodyPr rtlCol="0" anchor="ctr"/>
-          <a:lstStyle/>
-          <a:p>
-            <a:pPr algn="ctr"/>
-            <a:endParaRPr lang="en-US"/>
-          </a:p>
-        </p:txBody>
-      </p:sp>
-      <p:sp>
-        <p:nvSpPr>
-          <p:cNvPr id="51" name="TextBox 50"/>
-          <p:cNvSpPr txBox="1"/>
-          <p:nvPr/>
-        </p:nvSpPr>
-        <p:spPr>
-          <a:xfrm>
-            <a:off x="6524626" y="1637699"/>
-            <a:ext cx="623889" cy="461665"/>
-          </a:xfrm>
-          <a:prstGeom prst="rect">
-            <a:avLst/>
-          </a:prstGeom>
-          <a:noFill/>
-        </p:spPr>
-        <p:txBody>
-          <a:bodyPr wrap="none" rtlCol="0">
-            <a:spAutoFit/>
-          </a:bodyPr>
-          <a:lstStyle/>
-          <a:p>
-            <a:r>
-              <a:rPr lang="en-US" sz="2400" b="1">
-                <a:solidFill>
-                  <a:srgbClr val="FF0000"/>
-                </a:solidFill>
-              </a:rPr>
-              <a:t>R</a:t>
-            </a:r>
-            <a:r>
-              <a:rPr lang="en-US" sz="2400" b="1" baseline="-25000">
-                <a:solidFill>
-                  <a:srgbClr val="FF0000"/>
-                </a:solidFill>
-              </a:rPr>
-              <a:t>LM</a:t>
-            </a:r>
-          </a:p>
-        </p:txBody>
-      </p:sp>
-      <p:sp>
-        <p:nvSpPr>
-          <p:cNvPr id="52" name="TextBox 51"/>
-          <p:cNvSpPr txBox="1"/>
-          <p:nvPr/>
-        </p:nvSpPr>
-        <p:spPr>
-          <a:xfrm>
-            <a:off x="7525406" y="2720843"/>
-            <a:ext cx="572593" cy="461665"/>
-          </a:xfrm>
-          <a:prstGeom prst="rect">
-            <a:avLst/>
-          </a:prstGeom>
-          <a:noFill/>
-        </p:spPr>
-        <p:txBody>
-          <a:bodyPr wrap="none" rtlCol="0">
-            <a:spAutoFit/>
-          </a:bodyPr>
-          <a:lstStyle/>
-          <a:p>
-            <a:r>
-              <a:rPr lang="en-US" sz="2400" b="1">
-                <a:solidFill>
-                  <a:srgbClr val="FF0000"/>
-                </a:solidFill>
-              </a:rPr>
-              <a:t>z</a:t>
-            </a:r>
-            <a:r>
-              <a:rPr lang="en-US" sz="2400" b="1" baseline="-25000">
-                <a:solidFill>
-                  <a:srgbClr val="FF0000"/>
-                </a:solidFill>
-              </a:rPr>
-              <a:t>LM</a:t>
-            </a:r>
-          </a:p>
-        </p:txBody>
-      </p:sp>
-      <p:sp>
-        <p:nvSpPr>
-          <p:cNvPr id="53" name="TextBox 52"/>
-          <p:cNvSpPr txBox="1"/>
-          <p:nvPr/>
-        </p:nvSpPr>
-        <p:spPr>
-          <a:xfrm>
-            <a:off x="6224750" y="4188404"/>
-            <a:ext cx="527709" cy="461665"/>
-          </a:xfrm>
-          <a:prstGeom prst="rect">
-            <a:avLst/>
-          </a:prstGeom>
-          <a:noFill/>
-        </p:spPr>
-        <p:txBody>
-          <a:bodyPr wrap="none" rtlCol="0">
-            <a:spAutoFit/>
-          </a:bodyPr>
-          <a:lstStyle/>
-          <a:p>
-            <a:r>
-              <a:rPr lang="en-US" sz="2400" b="1">
-                <a:solidFill>
-                  <a:srgbClr val="FF0000"/>
-                </a:solidFill>
-              </a:rPr>
-              <a:t>R</a:t>
-            </a:r>
-            <a:r>
-              <a:rPr lang="en-US" sz="2400" b="1" baseline="-25000">
-                <a:solidFill>
-                  <a:srgbClr val="FF0000"/>
-                </a:solidFill>
-              </a:rPr>
-              <a:t>IR</a:t>
-            </a:r>
-          </a:p>
-        </p:txBody>
-      </p:sp>
-      <p:sp>
-        <p:nvSpPr>
-          <p:cNvPr id="54" name="TextBox 53"/>
-          <p:cNvSpPr txBox="1"/>
-          <p:nvPr/>
-        </p:nvSpPr>
-        <p:spPr>
-          <a:xfrm>
-            <a:off x="5500317" y="4749834"/>
-            <a:ext cx="657681" cy="461665"/>
-          </a:xfrm>
-          <a:prstGeom prst="rect">
-            <a:avLst/>
-          </a:prstGeom>
-          <a:noFill/>
-        </p:spPr>
-        <p:txBody>
-          <a:bodyPr wrap="none" rtlCol="0">
-            <a:spAutoFit/>
-          </a:bodyPr>
-          <a:lstStyle/>
-          <a:p>
-            <a:r>
-              <a:rPr lang="en-US" sz="2400" b="1">
-                <a:solidFill>
-                  <a:srgbClr val="FF0000"/>
-                </a:solidFill>
-              </a:rPr>
-              <a:t>R</a:t>
-            </a:r>
-            <a:r>
-              <a:rPr lang="en-US" sz="2400" b="1" baseline="-25000">
-                <a:solidFill>
-                  <a:srgbClr val="FF0000"/>
-                </a:solidFill>
-              </a:rPr>
-              <a:t>RW</a:t>
-            </a:r>
-          </a:p>
-        </p:txBody>
-      </p:sp>
-      <p:sp>
-        <p:nvSpPr>
-          <p:cNvPr id="55" name="Arc 54"/>
-          <p:cNvSpPr/>
-          <p:nvPr/>
-        </p:nvSpPr>
-        <p:spPr>
-          <a:xfrm rot="-5400000" flipV="1">
-            <a:off x="5714018" y="2799666"/>
-            <a:ext cx="791169" cy="765685"/>
-          </a:xfrm>
-          <a:prstGeom prst="arc">
-            <a:avLst>
-              <a:gd name="adj1" fmla="val 10937271"/>
-              <a:gd name="adj2" fmla="val 18920686"/>
-            </a:avLst>
-          </a:prstGeom>
-          <a:ln w="25400">
-            <a:solidFill>
-              <a:srgbClr val="FF0000"/>
-            </a:solidFill>
-            <a:tailEnd type="triangle" w="lg" len="lg"/>
-          </a:ln>
-        </p:spPr>
-        <p:style>
-          <a:lnRef idx="1">
-            <a:schemeClr val="accent1"/>
-          </a:lnRef>
-          <a:fillRef idx="0">
-            <a:schemeClr val="accent1"/>
-          </a:fillRef>
-          <a:effectRef idx="0">
-            <a:schemeClr val="accent1"/>
-          </a:effectRef>
-          <a:fontRef idx="minor">
-            <a:schemeClr val="tx1"/>
-          </a:fontRef>
-        </p:style>
-        <p:txBody>
-          <a:bodyPr rtlCol="0" anchor="ctr"/>
-          <a:lstStyle/>
-          <a:p>
-            <a:pPr algn="ctr"/>
-            <a:endParaRPr lang="en-US"/>
-          </a:p>
-        </p:txBody>
-      </p:sp>
-      <p:sp>
-        <p:nvSpPr>
-          <p:cNvPr id="56" name="TextBox 55"/>
-          <p:cNvSpPr txBox="1"/>
-          <p:nvPr/>
-        </p:nvSpPr>
-        <p:spPr>
-          <a:xfrm>
-            <a:off x="5500317" y="3494754"/>
-            <a:ext cx="652743" cy="461665"/>
-          </a:xfrm>
-          <a:prstGeom prst="rect">
-            <a:avLst/>
-          </a:prstGeom>
-          <a:noFill/>
-        </p:spPr>
-        <p:txBody>
-          <a:bodyPr wrap="none" rtlCol="0">
-            <a:spAutoFit/>
-          </a:bodyPr>
-          <a:lstStyle/>
-          <a:p>
-            <a:r>
-              <a:rPr lang="el-GR" sz="2400" b="1">
-                <a:solidFill>
-                  <a:srgbClr val="FF0000"/>
-                </a:solidFill>
-              </a:rPr>
-              <a:t>ψ</a:t>
-            </a:r>
-            <a:r>
-              <a:rPr lang="en-US" sz="2400" b="1" baseline="-25000">
-                <a:solidFill>
-                  <a:srgbClr val="FF0000"/>
-                </a:solidFill>
-              </a:rPr>
-              <a:t>RA</a:t>
-            </a:r>
-          </a:p>
-        </p:txBody>
-      </p:sp>
-      <p:sp>
-        <p:nvSpPr>
-          <p:cNvPr id="57" name="Arc 56"/>
-          <p:cNvSpPr/>
-          <p:nvPr/>
-        </p:nvSpPr>
-        <p:spPr>
-          <a:xfrm rot="-5400000" flipV="1">
-            <a:off x="5523208" y="2589087"/>
-            <a:ext cx="1179854" cy="1135530"/>
-          </a:xfrm>
-          <a:prstGeom prst="arc">
-            <a:avLst>
-              <a:gd name="adj1" fmla="val 10937271"/>
-              <a:gd name="adj2" fmla="val 12329916"/>
-            </a:avLst>
-          </a:prstGeom>
-          <a:ln w="25400">
-            <a:solidFill>
-              <a:srgbClr val="FF0000"/>
-            </a:solidFill>
-            <a:tailEnd type="triangle" w="lg" len="lg"/>
-          </a:ln>
-        </p:spPr>
-        <p:style>
-          <a:lnRef idx="1">
-            <a:schemeClr val="accent1"/>
-          </a:lnRef>
-          <a:fillRef idx="0">
-            <a:schemeClr val="accent1"/>
-          </a:fillRef>
-          <a:effectRef idx="0">
-            <a:schemeClr val="accent1"/>
-          </a:effectRef>
-          <a:fontRef idx="minor">
-            <a:schemeClr val="tx1"/>
-          </a:fontRef>
-        </p:style>
-        <p:txBody>
-          <a:bodyPr rtlCol="0" anchor="ctr"/>
-          <a:lstStyle/>
-          <a:p>
-            <a:pPr algn="ctr"/>
-            <a:endParaRPr lang="en-US"/>
-          </a:p>
-        </p:txBody>
-      </p:sp>
-      <p:sp>
-        <p:nvSpPr>
-          <p:cNvPr id="58" name="TextBox 57"/>
-          <p:cNvSpPr txBox="1"/>
-          <p:nvPr/>
-        </p:nvSpPr>
-        <p:spPr>
-          <a:xfrm>
-            <a:off x="277625" y="1301846"/>
-            <a:ext cx="4786788" cy="4385816"/>
-          </a:xfrm>
-          <a:prstGeom prst="rect">
-            <a:avLst/>
-          </a:prstGeom>
-          <a:noFill/>
-        </p:spPr>
-        <p:txBody>
-          <a:bodyPr wrap="square" rtlCol="0">
-            <a:spAutoFit/>
-          </a:bodyPr>
-          <a:lstStyle/>
-          <a:p>
-            <a:pPr marL="512763" indent="-512763">
-              <a:lnSpc>
-                <a:spcPct val="90000"/>
-              </a:lnSpc>
-              <a:spcBef>
-                <a:spcPts val="900"/>
-              </a:spcBef>
-            </a:pPr>
-            <a:r>
-              <a:rPr lang="en-US" sz="2000" dirty="0">
-                <a:solidFill>
-                  <a:schemeClr val="bg2">
-                    <a:lumMod val="75000"/>
-                  </a:schemeClr>
-                </a:solidFill>
-              </a:rPr>
-              <a:t>R</a:t>
-            </a:r>
-            <a:r>
-              <a:rPr lang="en-US" sz="2000" baseline="-25000" dirty="0">
-                <a:solidFill>
-                  <a:schemeClr val="bg2">
-                    <a:lumMod val="75000"/>
-                  </a:schemeClr>
-                </a:solidFill>
-              </a:rPr>
-              <a:t>RW</a:t>
-            </a:r>
-            <a:r>
-              <a:rPr lang="en-US" sz="2000" dirty="0">
-                <a:solidFill>
-                  <a:schemeClr val="bg2">
-                    <a:lumMod val="75000"/>
-                  </a:schemeClr>
-                </a:solidFill>
-              </a:rPr>
-              <a:t> = major radius of vacuum window</a:t>
-            </a:r>
-          </a:p>
-          <a:p>
-            <a:pPr marL="512763" indent="-512763">
-              <a:lnSpc>
-                <a:spcPct val="90000"/>
-              </a:lnSpc>
-              <a:spcBef>
-                <a:spcPts val="900"/>
-              </a:spcBef>
-            </a:pPr>
-            <a:r>
-              <a:rPr lang="en-US" sz="2000" dirty="0">
-                <a:solidFill>
-                  <a:schemeClr val="bg2">
-                    <a:lumMod val="75000"/>
-                  </a:schemeClr>
-                </a:solidFill>
-              </a:rPr>
-              <a:t>R</a:t>
-            </a:r>
-            <a:r>
-              <a:rPr lang="en-US" sz="2000" baseline="-25000" dirty="0">
-                <a:solidFill>
-                  <a:schemeClr val="bg2">
-                    <a:lumMod val="75000"/>
-                  </a:schemeClr>
-                </a:solidFill>
-              </a:rPr>
-              <a:t>IR</a:t>
-            </a:r>
-            <a:r>
-              <a:rPr lang="en-US" sz="2000" dirty="0">
-                <a:solidFill>
-                  <a:schemeClr val="bg2">
-                    <a:lumMod val="75000"/>
-                  </a:schemeClr>
-                </a:solidFill>
-              </a:rPr>
-              <a:t> = major radius of interaction region</a:t>
-            </a:r>
-          </a:p>
-          <a:p>
-            <a:pPr marL="512763" indent="-512763">
-              <a:lnSpc>
-                <a:spcPct val="90000"/>
-              </a:lnSpc>
-              <a:spcBef>
-                <a:spcPts val="900"/>
-              </a:spcBef>
-            </a:pPr>
-            <a:r>
-              <a:rPr lang="el-GR" sz="2000" dirty="0">
-                <a:solidFill>
-                  <a:schemeClr val="bg2">
-                    <a:lumMod val="75000"/>
-                  </a:schemeClr>
-                </a:solidFill>
-              </a:rPr>
-              <a:t>ψ</a:t>
-            </a:r>
-            <a:r>
-              <a:rPr lang="en-US" sz="2000" baseline="-25000" dirty="0">
-                <a:solidFill>
-                  <a:schemeClr val="bg2">
-                    <a:lumMod val="75000"/>
-                  </a:schemeClr>
-                </a:solidFill>
-              </a:rPr>
-              <a:t>RA</a:t>
-            </a:r>
-            <a:r>
-              <a:rPr lang="en-US" sz="2000" dirty="0">
-                <a:solidFill>
-                  <a:schemeClr val="bg2">
-                    <a:lumMod val="75000"/>
-                  </a:schemeClr>
-                </a:solidFill>
-              </a:rPr>
-              <a:t> = toroidal tilt angle of interaction region (</a:t>
-            </a:r>
-            <a:r>
-              <a:rPr lang="en-US" sz="2000" dirty="0" err="1">
-                <a:solidFill>
-                  <a:schemeClr val="bg2">
-                    <a:lumMod val="75000"/>
-                  </a:schemeClr>
-                </a:solidFill>
-              </a:rPr>
-              <a:t>w.r.t.</a:t>
-            </a:r>
-            <a:r>
-              <a:rPr lang="en-US" sz="2000" dirty="0">
-                <a:solidFill>
-                  <a:schemeClr val="bg2">
-                    <a:lumMod val="75000"/>
-                  </a:schemeClr>
-                </a:solidFill>
-              </a:rPr>
-              <a:t> plane of vacuum window)</a:t>
-            </a:r>
-          </a:p>
-          <a:p>
-            <a:pPr marL="512763" indent="-512763">
-              <a:lnSpc>
-                <a:spcPct val="90000"/>
-              </a:lnSpc>
-              <a:spcBef>
-                <a:spcPts val="900"/>
-              </a:spcBef>
-            </a:pPr>
-            <a:r>
-              <a:rPr lang="en-US" sz="2000" dirty="0"/>
-              <a:t>R</a:t>
-            </a:r>
-            <a:r>
-              <a:rPr lang="en-US" sz="2000" baseline="-25000" dirty="0"/>
-              <a:t>LM</a:t>
-            </a:r>
-            <a:r>
-              <a:rPr lang="en-US" sz="2000" dirty="0"/>
-              <a:t> = major radius of launch mirror</a:t>
-            </a:r>
-            <a:br>
-              <a:rPr lang="en-US" sz="2000" dirty="0"/>
-            </a:br>
-            <a:r>
-              <a:rPr lang="en-US" sz="2000" dirty="0"/>
-              <a:t>(fixed)</a:t>
-            </a:r>
-          </a:p>
-          <a:p>
-            <a:pPr marL="512763" indent="-512763">
-              <a:lnSpc>
-                <a:spcPct val="90000"/>
-              </a:lnSpc>
-              <a:spcBef>
-                <a:spcPts val="900"/>
-              </a:spcBef>
-            </a:pPr>
-            <a:r>
-              <a:rPr lang="el-GR" sz="2000" dirty="0"/>
-              <a:t>ψ</a:t>
-            </a:r>
-            <a:r>
-              <a:rPr lang="en-US" sz="2000" baseline="-25000" dirty="0"/>
-              <a:t>LM</a:t>
-            </a:r>
-            <a:r>
-              <a:rPr lang="en-US" sz="2000" dirty="0"/>
-              <a:t> = toroidal tilt angle of launch mirror</a:t>
-            </a:r>
-            <a:br>
-              <a:rPr lang="en-US" sz="2000" dirty="0"/>
-            </a:br>
-            <a:r>
-              <a:rPr lang="en-US" sz="2000" dirty="0"/>
-              <a:t>(</a:t>
-            </a:r>
-            <a:r>
-              <a:rPr lang="en-US" sz="2000" dirty="0" err="1"/>
-              <a:t>w.r.t.</a:t>
-            </a:r>
-            <a:r>
-              <a:rPr lang="en-US" sz="2000" dirty="0"/>
-              <a:t> plane of vacuum window)</a:t>
-            </a:r>
-          </a:p>
-          <a:p>
-            <a:pPr marL="512763" indent="-512763">
-              <a:lnSpc>
-                <a:spcPct val="90000"/>
-              </a:lnSpc>
-              <a:spcBef>
-                <a:spcPts val="900"/>
-              </a:spcBef>
-            </a:pPr>
-            <a:r>
-              <a:rPr lang="en-US" sz="2000" dirty="0" err="1"/>
-              <a:t>z</a:t>
-            </a:r>
-            <a:r>
-              <a:rPr lang="en-US" sz="2000" baseline="-25000" dirty="0" err="1"/>
-              <a:t>LM</a:t>
-            </a:r>
-            <a:r>
-              <a:rPr lang="en-US" sz="2000" dirty="0"/>
-              <a:t> = distance from launch steering mirror to interaction region</a:t>
-            </a:r>
-          </a:p>
-          <a:p>
-            <a:pPr marL="512763" indent="-512763">
-              <a:lnSpc>
-                <a:spcPct val="90000"/>
-              </a:lnSpc>
-              <a:spcBef>
-                <a:spcPts val="900"/>
-              </a:spcBef>
-            </a:pPr>
-            <a:r>
-              <a:rPr lang="el-GR" sz="2000" dirty="0"/>
-              <a:t>ψ</a:t>
-            </a:r>
-            <a:r>
-              <a:rPr lang="en-US" sz="2000" baseline="-25000" dirty="0"/>
-              <a:t>L</a:t>
-            </a:r>
-            <a:r>
-              <a:rPr lang="en-US" sz="2000" dirty="0"/>
-              <a:t> = toroidal tilt angle between launch beam and Radius vector (from torus center)</a:t>
-            </a:r>
-          </a:p>
-        </p:txBody>
-      </p:sp>
-      <p:sp>
-        <p:nvSpPr>
-          <p:cNvPr id="59" name="TextBox 58"/>
-          <p:cNvSpPr txBox="1"/>
-          <p:nvPr/>
-        </p:nvSpPr>
-        <p:spPr>
-          <a:xfrm>
-            <a:off x="6440724" y="2970414"/>
-            <a:ext cx="678391" cy="461665"/>
-          </a:xfrm>
-          <a:prstGeom prst="rect">
-            <a:avLst/>
-          </a:prstGeom>
-          <a:noFill/>
-        </p:spPr>
-        <p:txBody>
-          <a:bodyPr wrap="none" rtlCol="0">
-            <a:spAutoFit/>
-          </a:bodyPr>
-          <a:lstStyle/>
-          <a:p>
-            <a:r>
-              <a:rPr lang="el-GR" sz="2400" b="1">
-                <a:solidFill>
-                  <a:srgbClr val="FF0000"/>
-                </a:solidFill>
-              </a:rPr>
-              <a:t>ψ</a:t>
-            </a:r>
-            <a:r>
-              <a:rPr lang="en-US" sz="2400" b="1" baseline="-25000">
-                <a:solidFill>
-                  <a:srgbClr val="FF0000"/>
-                </a:solidFill>
-              </a:rPr>
-              <a:t>LM</a:t>
-            </a:r>
-          </a:p>
-        </p:txBody>
-      </p:sp>
-      <p:sp>
-        <p:nvSpPr>
-          <p:cNvPr id="60" name="TextBox 59"/>
-          <p:cNvSpPr txBox="1"/>
-          <p:nvPr/>
-        </p:nvSpPr>
-        <p:spPr>
-          <a:xfrm>
-            <a:off x="7555019" y="3402859"/>
-            <a:ext cx="4444100" cy="800219"/>
-          </a:xfrm>
-          <a:prstGeom prst="rect">
-            <a:avLst/>
-          </a:prstGeom>
-          <a:noFill/>
-        </p:spPr>
-        <p:txBody>
-          <a:bodyPr wrap="square" rtlCol="0">
-            <a:spAutoFit/>
-          </a:bodyPr>
-          <a:lstStyle/>
-          <a:p>
-            <a:pPr marL="512763" indent="-512763">
-              <a:lnSpc>
-                <a:spcPct val="90000"/>
-              </a:lnSpc>
-              <a:spcBef>
-                <a:spcPts val="1200"/>
-              </a:spcBef>
-            </a:pPr>
-            <a:r>
-              <a:rPr lang="en-US" sz="2000"/>
-              <a:t>z</a:t>
-            </a:r>
-            <a:r>
-              <a:rPr lang="en-US" sz="2000" baseline="-25000"/>
-              <a:t>LM</a:t>
-            </a:r>
-            <a:r>
-              <a:rPr lang="en-US" sz="2000" baseline="30000"/>
-              <a:t>2</a:t>
-            </a:r>
-            <a:r>
-              <a:rPr lang="en-US" sz="2000"/>
-              <a:t> = R</a:t>
-            </a:r>
-            <a:r>
-              <a:rPr lang="en-US" sz="2000" baseline="-25000"/>
-              <a:t>LM</a:t>
-            </a:r>
-            <a:r>
-              <a:rPr lang="en-US" sz="2000" baseline="30000"/>
-              <a:t>2</a:t>
-            </a:r>
-            <a:r>
-              <a:rPr lang="en-US" sz="2000"/>
-              <a:t> + R</a:t>
-            </a:r>
-            <a:r>
-              <a:rPr lang="en-US" sz="2000" baseline="-25000"/>
-              <a:t>IR</a:t>
-            </a:r>
-            <a:r>
-              <a:rPr lang="en-US" sz="2000" baseline="30000"/>
-              <a:t>2</a:t>
-            </a:r>
-            <a:r>
-              <a:rPr lang="en-US" sz="2000"/>
-              <a:t> – 2R</a:t>
-            </a:r>
-            <a:r>
-              <a:rPr lang="en-US" sz="2000" baseline="-25000"/>
-              <a:t>LM</a:t>
-            </a:r>
-            <a:r>
-              <a:rPr lang="en-US" sz="2000"/>
-              <a:t>·R</a:t>
-            </a:r>
-            <a:r>
-              <a:rPr lang="en-US" sz="2000" baseline="-25000"/>
-              <a:t>IR</a:t>
-            </a:r>
-            <a:r>
-              <a:rPr lang="en-US" sz="2000"/>
-              <a:t>·cos(</a:t>
-            </a:r>
-            <a:r>
-              <a:rPr lang="el-GR" sz="2000"/>
-              <a:t>ψ</a:t>
-            </a:r>
-            <a:r>
-              <a:rPr lang="en-US" sz="2000" baseline="-25000"/>
-              <a:t>LM</a:t>
-            </a:r>
-            <a:r>
-              <a:rPr lang="en-US" sz="2000"/>
-              <a:t> - </a:t>
-            </a:r>
-            <a:r>
-              <a:rPr lang="el-GR" sz="2000"/>
-              <a:t>ψ</a:t>
-            </a:r>
-            <a:r>
-              <a:rPr lang="en-US" sz="2000" baseline="-25000"/>
-              <a:t>RA</a:t>
-            </a:r>
-            <a:r>
-              <a:rPr lang="en-US" sz="2000"/>
-              <a:t>)</a:t>
-            </a:r>
-          </a:p>
-          <a:p>
-            <a:pPr marL="512763" indent="-512763">
-              <a:lnSpc>
-                <a:spcPct val="90000"/>
-              </a:lnSpc>
-              <a:spcBef>
-                <a:spcPts val="1200"/>
-              </a:spcBef>
-            </a:pPr>
-            <a:r>
-              <a:rPr lang="el-GR" sz="2000"/>
-              <a:t>ψ</a:t>
-            </a:r>
-            <a:r>
-              <a:rPr lang="en-US" sz="2000" baseline="-25000"/>
-              <a:t>L</a:t>
-            </a:r>
-            <a:r>
-              <a:rPr lang="en-US" sz="2000"/>
-              <a:t> = sin</a:t>
-            </a:r>
-            <a:r>
-              <a:rPr lang="en-US" sz="2000" baseline="30000"/>
-              <a:t>‒1</a:t>
-            </a:r>
-            <a:r>
-              <a:rPr lang="en-US" sz="2000">
-                <a:solidFill>
-                  <a:srgbClr val="0070C0"/>
-                </a:solidFill>
-              </a:rPr>
-              <a:t>(</a:t>
-            </a:r>
-            <a:r>
-              <a:rPr lang="en-US" sz="2000"/>
-              <a:t>(R</a:t>
-            </a:r>
-            <a:r>
-              <a:rPr lang="en-US" sz="2000" baseline="-25000"/>
-              <a:t>LM</a:t>
-            </a:r>
-            <a:r>
-              <a:rPr lang="en-US" sz="2000"/>
-              <a:t>/z</a:t>
-            </a:r>
-            <a:r>
-              <a:rPr lang="en-US" sz="2000" baseline="-25000"/>
-              <a:t>LM</a:t>
-            </a:r>
-            <a:r>
-              <a:rPr lang="en-US" sz="2000"/>
-              <a:t>)·sin(</a:t>
-            </a:r>
-            <a:r>
-              <a:rPr lang="el-GR" sz="2000"/>
-              <a:t>ψ</a:t>
-            </a:r>
-            <a:r>
-              <a:rPr lang="en-US" sz="2000" baseline="-25000"/>
-              <a:t>LM</a:t>
-            </a:r>
-            <a:r>
-              <a:rPr lang="en-US" sz="2000"/>
-              <a:t> - </a:t>
-            </a:r>
-            <a:r>
-              <a:rPr lang="el-GR" sz="2000"/>
-              <a:t>ψ</a:t>
-            </a:r>
-            <a:r>
-              <a:rPr lang="en-US" sz="2000" baseline="-25000"/>
-              <a:t>RA</a:t>
-            </a:r>
-            <a:r>
-              <a:rPr lang="en-US" sz="2000"/>
-              <a:t>)</a:t>
-            </a:r>
-            <a:r>
-              <a:rPr lang="en-US" sz="2000">
-                <a:solidFill>
-                  <a:srgbClr val="0070C0"/>
-                </a:solidFill>
-              </a:rPr>
-              <a:t>)</a:t>
-            </a:r>
-          </a:p>
-        </p:txBody>
-      </p:sp>
-    </p:spTree>
-    <p:extLst>
-      <p:ext uri="{BB962C8B-B14F-4D97-AF65-F5344CB8AC3E}">
-        <p14:creationId xmlns:p14="http://schemas.microsoft.com/office/powerpoint/2010/main" val="773995941"/>
       </p:ext>
     </p:extLst>
   </p:cSld>

</xml_diff>

<commit_message>
launch optical normal angle
</commit_message>
<xml_diff>
--- a/NSTX-U High-k scattering Calculation_20240717.pptx
+++ b/NSTX-U High-k scattering Calculation_20240717.pptx
@@ -221,7 +221,7 @@
           <a:p>
             <a:fld id="{DD7963AF-3B9E-4119-83FE-F39BCC844B14}" type="datetimeFigureOut">
               <a:rPr lang="en-US" smtClean="0"/>
-              <a:t>8/18/2024</a:t>
+              <a:t>8/21/2024</a:t>
             </a:fld>
             <a:endParaRPr lang="en-US"/>
           </a:p>
@@ -803,7 +803,7 @@
           <a:p>
             <a:fld id="{2EC1DD9D-CA1B-479F-BE79-11C3EFEF4B50}" type="datetime1">
               <a:rPr lang="en-US" smtClean="0"/>
-              <a:t>8/18/2024</a:t>
+              <a:t>8/21/2024</a:t>
             </a:fld>
             <a:endParaRPr lang="en-US"/>
           </a:p>
@@ -1001,7 +1001,7 @@
           <a:p>
             <a:fld id="{160DA2DE-8EC2-4FCA-AD49-11B9FCD880CB}" type="datetime1">
               <a:rPr lang="en-US" smtClean="0"/>
-              <a:t>8/18/2024</a:t>
+              <a:t>8/21/2024</a:t>
             </a:fld>
             <a:endParaRPr lang="en-US"/>
           </a:p>
@@ -1209,7 +1209,7 @@
           <a:p>
             <a:fld id="{1E5F0B84-C28F-412A-BE67-67A4E55E8DE3}" type="datetime1">
               <a:rPr lang="en-US" smtClean="0"/>
-              <a:t>8/18/2024</a:t>
+              <a:t>8/21/2024</a:t>
             </a:fld>
             <a:endParaRPr lang="en-US"/>
           </a:p>
@@ -1407,7 +1407,7 @@
           <a:p>
             <a:fld id="{10779873-1D2C-44E0-B4E0-420637316734}" type="datetime1">
               <a:rPr lang="en-US" smtClean="0"/>
-              <a:t>8/18/2024</a:t>
+              <a:t>8/21/2024</a:t>
             </a:fld>
             <a:endParaRPr lang="en-US"/>
           </a:p>
@@ -1682,7 +1682,7 @@
           <a:p>
             <a:fld id="{C271B5B0-0C16-4B7D-9155-78F1E7EADB49}" type="datetime1">
               <a:rPr lang="en-US" smtClean="0"/>
-              <a:t>8/18/2024</a:t>
+              <a:t>8/21/2024</a:t>
             </a:fld>
             <a:endParaRPr lang="en-US"/>
           </a:p>
@@ -1947,7 +1947,7 @@
           <a:p>
             <a:fld id="{FAB7F6B7-890D-45C7-8636-8D1462C0D7AD}" type="datetime1">
               <a:rPr lang="en-US" smtClean="0"/>
-              <a:t>8/18/2024</a:t>
+              <a:t>8/21/2024</a:t>
             </a:fld>
             <a:endParaRPr lang="en-US"/>
           </a:p>
@@ -2359,7 +2359,7 @@
           <a:p>
             <a:fld id="{11D0E5F2-6308-4D6F-8CD7-5A3B75C59A74}" type="datetime1">
               <a:rPr lang="en-US" smtClean="0"/>
-              <a:t>8/18/2024</a:t>
+              <a:t>8/21/2024</a:t>
             </a:fld>
             <a:endParaRPr lang="en-US"/>
           </a:p>
@@ -2500,7 +2500,7 @@
           <a:p>
             <a:fld id="{4502C388-294A-4E97-9D69-20513486725D}" type="datetime1">
               <a:rPr lang="en-US" smtClean="0"/>
-              <a:t>8/18/2024</a:t>
+              <a:t>8/21/2024</a:t>
             </a:fld>
             <a:endParaRPr lang="en-US"/>
           </a:p>
@@ -2613,7 +2613,7 @@
           <a:p>
             <a:fld id="{BB7E84F5-3369-41E4-A9A6-434E5B269F05}" type="datetime1">
               <a:rPr lang="en-US" smtClean="0"/>
-              <a:t>8/18/2024</a:t>
+              <a:t>8/21/2024</a:t>
             </a:fld>
             <a:endParaRPr lang="en-US"/>
           </a:p>
@@ -2924,7 +2924,7 @@
           <a:p>
             <a:fld id="{C7AB5A68-3BAA-4592-B439-79E1A04F2C87}" type="datetime1">
               <a:rPr lang="en-US" smtClean="0"/>
-              <a:t>8/18/2024</a:t>
+              <a:t>8/21/2024</a:t>
             </a:fld>
             <a:endParaRPr lang="en-US"/>
           </a:p>
@@ -3212,7 +3212,7 @@
           <a:p>
             <a:fld id="{854EA51C-EC9E-4686-A598-4B64219D07AF}" type="datetime1">
               <a:rPr lang="en-US" smtClean="0"/>
-              <a:t>8/18/2024</a:t>
+              <a:t>8/21/2024</a:t>
             </a:fld>
             <a:endParaRPr lang="en-US"/>
           </a:p>
@@ -3453,7 +3453,7 @@
           <a:p>
             <a:fld id="{9292DAD1-9542-4687-A0FA-737321B65C62}" type="datetime1">
               <a:rPr lang="en-US" smtClean="0"/>
-              <a:t>8/18/2024</a:t>
+              <a:t>8/21/2024</a:t>
             </a:fld>
             <a:endParaRPr lang="en-US"/>
           </a:p>
@@ -5497,6 +5497,227 @@
           </a:p>
         </p:txBody>
       </p:sp>
+      <p:cxnSp>
+        <p:nvCxnSpPr>
+          <p:cNvPr id="4" name="Straight Arrow Connector 3">
+            <a:extLst>
+              <a:ext uri="{FF2B5EF4-FFF2-40B4-BE49-F238E27FC236}">
+                <a16:creationId xmlns:a16="http://schemas.microsoft.com/office/drawing/2014/main" id="{FE5F0C7B-92A4-6324-DEAD-286C61946B89}"/>
+              </a:ext>
+            </a:extLst>
+          </p:cNvPr>
+          <p:cNvCxnSpPr>
+            <a:cxnSpLocks/>
+          </p:cNvCxnSpPr>
+          <p:nvPr/>
+        </p:nvCxnSpPr>
+        <p:spPr>
+          <a:xfrm flipH="1">
+            <a:off x="7546171" y="660211"/>
+            <a:ext cx="3239098" cy="5067536"/>
+          </a:xfrm>
+          <a:prstGeom prst="straightConnector1">
+            <a:avLst/>
+          </a:prstGeom>
+          <a:ln>
+            <a:tailEnd type="triangle"/>
+          </a:ln>
+        </p:spPr>
+        <p:style>
+          <a:lnRef idx="2">
+            <a:schemeClr val="accent1"/>
+          </a:lnRef>
+          <a:fillRef idx="0">
+            <a:schemeClr val="accent1"/>
+          </a:fillRef>
+          <a:effectRef idx="1">
+            <a:schemeClr val="accent1"/>
+          </a:effectRef>
+          <a:fontRef idx="minor">
+            <a:schemeClr val="tx1"/>
+          </a:fontRef>
+        </p:style>
+      </p:cxnSp>
+      <p:sp>
+        <p:nvSpPr>
+          <p:cNvPr id="5" name="Arc 4">
+            <a:extLst>
+              <a:ext uri="{FF2B5EF4-FFF2-40B4-BE49-F238E27FC236}">
+                <a16:creationId xmlns:a16="http://schemas.microsoft.com/office/drawing/2014/main" id="{8123F88D-66CA-A7ED-8805-64B148BD75B8}"/>
+              </a:ext>
+            </a:extLst>
+          </p:cNvPr>
+          <p:cNvSpPr/>
+          <p:nvPr/>
+        </p:nvSpPr>
+        <p:spPr>
+          <a:xfrm rot="9450372">
+            <a:off x="10216471" y="1051144"/>
+            <a:ext cx="326427" cy="319990"/>
+          </a:xfrm>
+          <a:prstGeom prst="arc">
+            <a:avLst>
+              <a:gd name="adj1" fmla="val 18423599"/>
+              <a:gd name="adj2" fmla="val 0"/>
+            </a:avLst>
+          </a:prstGeom>
+          <a:ln>
+            <a:solidFill>
+              <a:srgbClr val="FF0000"/>
+            </a:solidFill>
+            <a:headEnd type="arrow"/>
+            <a:tailEnd type="none"/>
+          </a:ln>
+        </p:spPr>
+        <p:style>
+          <a:lnRef idx="2">
+            <a:schemeClr val="accent1"/>
+          </a:lnRef>
+          <a:fillRef idx="0">
+            <a:schemeClr val="accent1"/>
+          </a:fillRef>
+          <a:effectRef idx="1">
+            <a:schemeClr val="accent1"/>
+          </a:effectRef>
+          <a:fontRef idx="minor">
+            <a:schemeClr val="tx1"/>
+          </a:fontRef>
+        </p:style>
+        <p:txBody>
+          <a:bodyPr rtlCol="0" anchor="ctr"/>
+          <a:lstStyle/>
+          <a:p>
+            <a:pPr algn="ctr"/>
+            <a:endParaRPr lang="en-US"/>
+          </a:p>
+        </p:txBody>
+      </p:sp>
+      <mc:AlternateContent xmlns:mc="http://schemas.openxmlformats.org/markup-compatibility/2006">
+        <mc:Choice xmlns:a14="http://schemas.microsoft.com/office/drawing/2010/main" Requires="a14">
+          <p:sp>
+            <p:nvSpPr>
+              <p:cNvPr id="7" name="TextBox 6">
+                <a:extLst>
+                  <a:ext uri="{FF2B5EF4-FFF2-40B4-BE49-F238E27FC236}">
+                    <a16:creationId xmlns:a16="http://schemas.microsoft.com/office/drawing/2014/main" id="{3C9429E1-0E0F-53C6-FD2B-B5596E84D547}"/>
+                  </a:ext>
+                </a:extLst>
+              </p:cNvPr>
+              <p:cNvSpPr txBox="1"/>
+              <p:nvPr/>
+            </p:nvSpPr>
+            <p:spPr>
+              <a:xfrm>
+                <a:off x="10405517" y="1432179"/>
+                <a:ext cx="1479897" cy="639983"/>
+              </a:xfrm>
+              <a:prstGeom prst="rect">
+                <a:avLst/>
+              </a:prstGeom>
+              <a:noFill/>
+            </p:spPr>
+            <p:txBody>
+              <a:bodyPr wrap="square" rtlCol="0">
+                <a:spAutoFit/>
+              </a:bodyPr>
+              <a:lstStyle/>
+              <a:p>
+                <a14:m>
+                  <m:oMathPara xmlns:m="http://schemas.openxmlformats.org/officeDocument/2006/math">
+                    <m:oMathParaPr>
+                      <m:jc m:val="centerGroup"/>
+                    </m:oMathParaPr>
+                    <m:oMath xmlns:m="http://schemas.openxmlformats.org/officeDocument/2006/math">
+                      <m:sSub>
+                        <m:sSubPr>
+                          <m:ctrlPr>
+                            <a:rPr lang="en-US" b="0" i="1" smtClean="0">
+                              <a:latin typeface="Cambria Math" panose="02040503050406030204" pitchFamily="18" charset="0"/>
+                            </a:rPr>
+                          </m:ctrlPr>
+                        </m:sSubPr>
+                        <m:e>
+                          <m:r>
+                            <a:rPr lang="en-US" b="0" i="1" smtClean="0">
+                              <a:latin typeface="Cambria Math" panose="02040503050406030204" pitchFamily="18" charset="0"/>
+                            </a:rPr>
+                            <m:t>𝜃</m:t>
+                          </m:r>
+                        </m:e>
+                        <m:sub>
+                          <m:r>
+                            <a:rPr lang="en-US" b="0" i="1" smtClean="0">
+                              <a:latin typeface="Cambria Math" panose="02040503050406030204" pitchFamily="18" charset="0"/>
+                            </a:rPr>
+                            <m:t>𝑛𝑜𝑟𝑚𝑎𝑙</m:t>
+                          </m:r>
+                        </m:sub>
+                      </m:sSub>
+                      <m:r>
+                        <a:rPr lang="en-US" b="0" i="1" smtClean="0">
+                          <a:latin typeface="Cambria Math" panose="02040503050406030204" pitchFamily="18" charset="0"/>
+                        </a:rPr>
+                        <m:t>=14.555 </m:t>
+                      </m:r>
+                      <m:r>
+                        <a:rPr lang="en-US" b="0" i="1" smtClean="0">
+                          <a:latin typeface="Cambria Math" panose="02040503050406030204" pitchFamily="18" charset="0"/>
+                        </a:rPr>
+                        <m:t>𝑑𝑒𝑔</m:t>
+                      </m:r>
+                    </m:oMath>
+                  </m:oMathPara>
+                </a14:m>
+                <a:endParaRPr lang="en-US" dirty="0"/>
+              </a:p>
+            </p:txBody>
+          </p:sp>
+        </mc:Choice>
+        <mc:Fallback>
+          <p:sp>
+            <p:nvSpPr>
+              <p:cNvPr id="7" name="TextBox 6">
+                <a:extLst>
+                  <a:ext uri="{FF2B5EF4-FFF2-40B4-BE49-F238E27FC236}">
+                    <a16:creationId xmlns:a16="http://schemas.microsoft.com/office/drawing/2014/main" id="{3C9429E1-0E0F-53C6-FD2B-B5596E84D547}"/>
+                  </a:ext>
+                </a:extLst>
+              </p:cNvPr>
+              <p:cNvSpPr txBox="1">
+                <a:spLocks noRot="1" noChangeAspect="1" noMove="1" noResize="1" noEditPoints="1" noAdjustHandles="1" noChangeArrowheads="1" noChangeShapeType="1" noTextEdit="1"/>
+              </p:cNvSpPr>
+              <p:nvPr/>
+            </p:nvSpPr>
+            <p:spPr>
+              <a:xfrm>
+                <a:off x="10405517" y="1432179"/>
+                <a:ext cx="1479897" cy="639983"/>
+              </a:xfrm>
+              <a:prstGeom prst="rect">
+                <a:avLst/>
+              </a:prstGeom>
+              <a:blipFill>
+                <a:blip r:embed="rId3"/>
+                <a:stretch>
+                  <a:fillRect r="-5350" b="-6667"/>
+                </a:stretch>
+              </a:blipFill>
+            </p:spPr>
+            <p:txBody>
+              <a:bodyPr/>
+              <a:lstStyle/>
+              <a:p>
+                <a:r>
+                  <a:rPr lang="en-US">
+                    <a:noFill/>
+                  </a:rPr>
+                  <a:t> </a:t>
+                </a:r>
+              </a:p>
+            </p:txBody>
+          </p:sp>
+        </mc:Fallback>
+      </mc:AlternateContent>
     </p:spTree>
     <p:extLst>
       <p:ext uri="{BB962C8B-B14F-4D97-AF65-F5344CB8AC3E}">
@@ -18782,8 +19003,8 @@
             </a:p>
           </p:txBody>
         </p:sp>
-        <mc:AlternateContent xmlns:mc="http://schemas.openxmlformats.org/markup-compatibility/2006">
-          <mc:Choice xmlns:a14="http://schemas.microsoft.com/office/drawing/2010/main" Requires="a14">
+        <mc:AlternateContent xmlns:mc="http://schemas.openxmlformats.org/markup-compatibility/2006" xmlns:a14="http://schemas.microsoft.com/office/drawing/2010/main">
+          <mc:Choice Requires="a14">
             <p:sp>
               <p:nvSpPr>
                 <p:cNvPr id="10" name="TextBox 9">
@@ -18812,6 +19033,7 @@
                 </a:bodyPr>
                 <a:lstStyle/>
                 <a:p>
+                  <a:pPr/>
                   <a14:m>
                     <m:oMathPara xmlns:m="http://schemas.openxmlformats.org/officeDocument/2006/math">
                       <m:oMathParaPr>
@@ -18860,7 +19082,7 @@
               </p:txBody>
             </p:sp>
           </mc:Choice>
-          <mc:Fallback>
+          <mc:Fallback xmlns="">
             <p:sp>
               <p:nvSpPr>
                 <p:cNvPr id="10" name="TextBox 9">

</xml_diff>